<commit_message>
Corrected minor math typos in slides
</commit_message>
<xml_diff>
--- a/slides/2_BigDataComputing.pptx
+++ b/slides/2_BigDataComputing.pptx
@@ -242,7 +242,7 @@
           <a:p>
             <a:fld id="{2F3ABF1A-8818-4472-8518-E71DC7B5D2F7}" type="datetimeFigureOut">
               <a:rPr lang="en-US" smtClean="0"/>
-              <a:t>6/21/2023</a:t>
+              <a:t>6/25/2023</a:t>
             </a:fld>
             <a:endParaRPr lang="en-US"/>
           </a:p>
@@ -827,7 +827,7 @@
           <a:p>
             <a:fld id="{6E4A31BF-7266-4BEB-918B-ADC21C630A6F}" type="datetimeFigureOut">
               <a:rPr lang="en-US" smtClean="0"/>
-              <a:t>6/21/2023</a:t>
+              <a:t>6/25/2023</a:t>
             </a:fld>
             <a:endParaRPr lang="en-US"/>
           </a:p>
@@ -1025,7 +1025,7 @@
           <a:p>
             <a:fld id="{6E4A31BF-7266-4BEB-918B-ADC21C630A6F}" type="datetimeFigureOut">
               <a:rPr lang="en-US" smtClean="0"/>
-              <a:t>6/21/2023</a:t>
+              <a:t>6/25/2023</a:t>
             </a:fld>
             <a:endParaRPr lang="en-US"/>
           </a:p>
@@ -1233,7 +1233,7 @@
           <a:p>
             <a:fld id="{6E4A31BF-7266-4BEB-918B-ADC21C630A6F}" type="datetimeFigureOut">
               <a:rPr lang="en-US" smtClean="0"/>
-              <a:t>6/21/2023</a:t>
+              <a:t>6/25/2023</a:t>
             </a:fld>
             <a:endParaRPr lang="en-US"/>
           </a:p>
@@ -1431,7 +1431,7 @@
           <a:p>
             <a:fld id="{6E4A31BF-7266-4BEB-918B-ADC21C630A6F}" type="datetimeFigureOut">
               <a:rPr lang="en-US" smtClean="0"/>
-              <a:t>6/21/2023</a:t>
+              <a:t>6/25/2023</a:t>
             </a:fld>
             <a:endParaRPr lang="en-US"/>
           </a:p>
@@ -1706,7 +1706,7 @@
           <a:p>
             <a:fld id="{6E4A31BF-7266-4BEB-918B-ADC21C630A6F}" type="datetimeFigureOut">
               <a:rPr lang="en-US" smtClean="0"/>
-              <a:t>6/21/2023</a:t>
+              <a:t>6/25/2023</a:t>
             </a:fld>
             <a:endParaRPr lang="en-US"/>
           </a:p>
@@ -1971,7 +1971,7 @@
           <a:p>
             <a:fld id="{6E4A31BF-7266-4BEB-918B-ADC21C630A6F}" type="datetimeFigureOut">
               <a:rPr lang="en-US" smtClean="0"/>
-              <a:t>6/21/2023</a:t>
+              <a:t>6/25/2023</a:t>
             </a:fld>
             <a:endParaRPr lang="en-US"/>
           </a:p>
@@ -2383,7 +2383,7 @@
           <a:p>
             <a:fld id="{6E4A31BF-7266-4BEB-918B-ADC21C630A6F}" type="datetimeFigureOut">
               <a:rPr lang="en-US" smtClean="0"/>
-              <a:t>6/21/2023</a:t>
+              <a:t>6/25/2023</a:t>
             </a:fld>
             <a:endParaRPr lang="en-US"/>
           </a:p>
@@ -2524,7 +2524,7 @@
           <a:p>
             <a:fld id="{6E4A31BF-7266-4BEB-918B-ADC21C630A6F}" type="datetimeFigureOut">
               <a:rPr lang="en-US" smtClean="0"/>
-              <a:t>6/21/2023</a:t>
+              <a:t>6/25/2023</a:t>
             </a:fld>
             <a:endParaRPr lang="en-US"/>
           </a:p>
@@ -2637,7 +2637,7 @@
           <a:p>
             <a:fld id="{6E4A31BF-7266-4BEB-918B-ADC21C630A6F}" type="datetimeFigureOut">
               <a:rPr lang="en-US" smtClean="0"/>
-              <a:t>6/21/2023</a:t>
+              <a:t>6/25/2023</a:t>
             </a:fld>
             <a:endParaRPr lang="en-US"/>
           </a:p>
@@ -2948,7 +2948,7 @@
           <a:p>
             <a:fld id="{6E4A31BF-7266-4BEB-918B-ADC21C630A6F}" type="datetimeFigureOut">
               <a:rPr lang="en-US" smtClean="0"/>
-              <a:t>6/21/2023</a:t>
+              <a:t>6/25/2023</a:t>
             </a:fld>
             <a:endParaRPr lang="en-US"/>
           </a:p>
@@ -3236,7 +3236,7 @@
           <a:p>
             <a:fld id="{6E4A31BF-7266-4BEB-918B-ADC21C630A6F}" type="datetimeFigureOut">
               <a:rPr lang="en-US" smtClean="0"/>
-              <a:t>6/21/2023</a:t>
+              <a:t>6/25/2023</a:t>
             </a:fld>
             <a:endParaRPr lang="en-US"/>
           </a:p>
@@ -3477,7 +3477,7 @@
           <a:p>
             <a:fld id="{6E4A31BF-7266-4BEB-918B-ADC21C630A6F}" type="datetimeFigureOut">
               <a:rPr lang="en-US" smtClean="0"/>
-              <a:t>6/21/2023</a:t>
+              <a:t>6/25/2023</a:t>
             </a:fld>
             <a:endParaRPr lang="en-US"/>
           </a:p>
@@ -12950,8 +12950,8 @@
           <a:chExt cx="0" cy="0"/>
         </a:xfrm>
       </p:grpSpPr>
-      <mc:AlternateContent xmlns:mc="http://schemas.openxmlformats.org/markup-compatibility/2006" xmlns:a14="http://schemas.microsoft.com/office/drawing/2010/main">
-        <mc:Choice Requires="a14">
+      <mc:AlternateContent xmlns:mc="http://schemas.openxmlformats.org/markup-compatibility/2006">
+        <mc:Choice xmlns:a14="http://schemas.microsoft.com/office/drawing/2010/main" Requires="a14">
           <p:sp>
             <p:nvSpPr>
               <p:cNvPr id="3" name="Content Placeholder 2">
@@ -13115,7 +13115,7 @@
                           <a:rPr lang="en-US" b="0" i="1" smtClean="0">
                             <a:latin typeface="Cambria Math" panose="02040503050406030204" pitchFamily="18" charset="0"/>
                           </a:rPr>
-                          <m:t>𝑆</m:t>
+                          <m:t>𝑅</m:t>
                         </m:r>
                         <m:r>
                           <a:rPr lang="en-US" b="0" i="1" smtClean="0">
@@ -13162,7 +13162,7 @@
                           <a:rPr lang="en-US" b="0" i="0" smtClean="0">
                             <a:latin typeface="Cambria Math" panose="02040503050406030204" pitchFamily="18" charset="0"/>
                           </a:rPr>
-                          <m:t>R</m:t>
+                          <m:t>S</m:t>
                         </m:r>
                         <m:r>
                           <a:rPr lang="en-US" b="0" i="0" smtClean="0">
@@ -13538,7 +13538,7 @@
             </p:txBody>
           </p:sp>
         </mc:Choice>
-        <mc:Fallback xmlns="">
+        <mc:Fallback>
           <p:sp>
             <p:nvSpPr>
               <p:cNvPr id="3" name="Content Placeholder 2">
@@ -13648,449 +13648,6 @@
   <p:clrMapOvr>
     <a:masterClrMapping/>
   </p:clrMapOvr>
-  <p:timing>
-    <p:tnLst>
-      <p:par>
-        <p:cTn id="1" dur="indefinite" restart="never" nodeType="tmRoot">
-          <p:childTnLst>
-            <p:seq concurrent="1" nextAc="seek">
-              <p:cTn id="2" dur="indefinite" nodeType="mainSeq">
-                <p:childTnLst>
-                  <p:par>
-                    <p:cTn id="3" fill="hold">
-                      <p:stCondLst>
-                        <p:cond delay="indefinite"/>
-                      </p:stCondLst>
-                      <p:childTnLst>
-                        <p:par>
-                          <p:cTn id="4" fill="hold">
-                            <p:stCondLst>
-                              <p:cond delay="0"/>
-                            </p:stCondLst>
-                            <p:childTnLst>
-                              <p:par>
-                                <p:cTn id="5" presetID="1" presetClass="entr" presetSubtype="0" fill="hold" nodeType="clickEffect">
-                                  <p:stCondLst>
-                                    <p:cond delay="0"/>
-                                  </p:stCondLst>
-                                  <p:childTnLst>
-                                    <p:set>
-                                      <p:cBhvr>
-                                        <p:cTn id="6" dur="1" fill="hold">
-                                          <p:stCondLst>
-                                            <p:cond delay="0"/>
-                                          </p:stCondLst>
-                                        </p:cTn>
-                                        <p:tgtEl>
-                                          <p:spTgt spid="3">
-                                            <p:txEl>
-                                              <p:pRg st="1" end="1"/>
-                                            </p:txEl>
-                                          </p:spTgt>
-                                        </p:tgtEl>
-                                        <p:attrNameLst>
-                                          <p:attrName>style.visibility</p:attrName>
-                                        </p:attrNameLst>
-                                      </p:cBhvr>
-                                      <p:to>
-                                        <p:strVal val="visible"/>
-                                      </p:to>
-                                    </p:set>
-                                  </p:childTnLst>
-                                </p:cTn>
-                              </p:par>
-                            </p:childTnLst>
-                          </p:cTn>
-                        </p:par>
-                      </p:childTnLst>
-                    </p:cTn>
-                  </p:par>
-                  <p:par>
-                    <p:cTn id="7" fill="hold">
-                      <p:stCondLst>
-                        <p:cond delay="indefinite"/>
-                      </p:stCondLst>
-                      <p:childTnLst>
-                        <p:par>
-                          <p:cTn id="8" fill="hold">
-                            <p:stCondLst>
-                              <p:cond delay="0"/>
-                            </p:stCondLst>
-                            <p:childTnLst>
-                              <p:par>
-                                <p:cTn id="9" presetID="1" presetClass="entr" presetSubtype="0" fill="hold" nodeType="clickEffect">
-                                  <p:stCondLst>
-                                    <p:cond delay="0"/>
-                                  </p:stCondLst>
-                                  <p:childTnLst>
-                                    <p:set>
-                                      <p:cBhvr>
-                                        <p:cTn id="10" dur="1" fill="hold">
-                                          <p:stCondLst>
-                                            <p:cond delay="0"/>
-                                          </p:stCondLst>
-                                        </p:cTn>
-                                        <p:tgtEl>
-                                          <p:spTgt spid="3">
-                                            <p:txEl>
-                                              <p:pRg st="2" end="2"/>
-                                            </p:txEl>
-                                          </p:spTgt>
-                                        </p:tgtEl>
-                                        <p:attrNameLst>
-                                          <p:attrName>style.visibility</p:attrName>
-                                        </p:attrNameLst>
-                                      </p:cBhvr>
-                                      <p:to>
-                                        <p:strVal val="visible"/>
-                                      </p:to>
-                                    </p:set>
-                                  </p:childTnLst>
-                                </p:cTn>
-                              </p:par>
-                              <p:par>
-                                <p:cTn id="11" presetID="1" presetClass="entr" presetSubtype="0" fill="hold" nodeType="withEffect">
-                                  <p:stCondLst>
-                                    <p:cond delay="0"/>
-                                  </p:stCondLst>
-                                  <p:childTnLst>
-                                    <p:set>
-                                      <p:cBhvr>
-                                        <p:cTn id="12" dur="1" fill="hold">
-                                          <p:stCondLst>
-                                            <p:cond delay="0"/>
-                                          </p:stCondLst>
-                                        </p:cTn>
-                                        <p:tgtEl>
-                                          <p:spTgt spid="3">
-                                            <p:txEl>
-                                              <p:pRg st="3" end="3"/>
-                                            </p:txEl>
-                                          </p:spTgt>
-                                        </p:tgtEl>
-                                        <p:attrNameLst>
-                                          <p:attrName>style.visibility</p:attrName>
-                                        </p:attrNameLst>
-                                      </p:cBhvr>
-                                      <p:to>
-                                        <p:strVal val="visible"/>
-                                      </p:to>
-                                    </p:set>
-                                  </p:childTnLst>
-                                </p:cTn>
-                              </p:par>
-                              <p:par>
-                                <p:cTn id="13" presetID="1" presetClass="entr" presetSubtype="0" fill="hold" nodeType="withEffect">
-                                  <p:stCondLst>
-                                    <p:cond delay="0"/>
-                                  </p:stCondLst>
-                                  <p:childTnLst>
-                                    <p:set>
-                                      <p:cBhvr>
-                                        <p:cTn id="14" dur="1" fill="hold">
-                                          <p:stCondLst>
-                                            <p:cond delay="0"/>
-                                          </p:stCondLst>
-                                        </p:cTn>
-                                        <p:tgtEl>
-                                          <p:spTgt spid="3">
-                                            <p:txEl>
-                                              <p:pRg st="4" end="4"/>
-                                            </p:txEl>
-                                          </p:spTgt>
-                                        </p:tgtEl>
-                                        <p:attrNameLst>
-                                          <p:attrName>style.visibility</p:attrName>
-                                        </p:attrNameLst>
-                                      </p:cBhvr>
-                                      <p:to>
-                                        <p:strVal val="visible"/>
-                                      </p:to>
-                                    </p:set>
-                                  </p:childTnLst>
-                                </p:cTn>
-                              </p:par>
-                              <p:par>
-                                <p:cTn id="15" presetID="1" presetClass="entr" presetSubtype="0" fill="hold" nodeType="withEffect">
-                                  <p:stCondLst>
-                                    <p:cond delay="0"/>
-                                  </p:stCondLst>
-                                  <p:childTnLst>
-                                    <p:set>
-                                      <p:cBhvr>
-                                        <p:cTn id="16" dur="1" fill="hold">
-                                          <p:stCondLst>
-                                            <p:cond delay="0"/>
-                                          </p:stCondLst>
-                                        </p:cTn>
-                                        <p:tgtEl>
-                                          <p:spTgt spid="3">
-                                            <p:txEl>
-                                              <p:pRg st="5" end="5"/>
-                                            </p:txEl>
-                                          </p:spTgt>
-                                        </p:tgtEl>
-                                        <p:attrNameLst>
-                                          <p:attrName>style.visibility</p:attrName>
-                                        </p:attrNameLst>
-                                      </p:cBhvr>
-                                      <p:to>
-                                        <p:strVal val="visible"/>
-                                      </p:to>
-                                    </p:set>
-                                  </p:childTnLst>
-                                </p:cTn>
-                              </p:par>
-                            </p:childTnLst>
-                          </p:cTn>
-                        </p:par>
-                      </p:childTnLst>
-                    </p:cTn>
-                  </p:par>
-                  <p:par>
-                    <p:cTn id="17" fill="hold">
-                      <p:stCondLst>
-                        <p:cond delay="indefinite"/>
-                      </p:stCondLst>
-                      <p:childTnLst>
-                        <p:par>
-                          <p:cTn id="18" fill="hold">
-                            <p:stCondLst>
-                              <p:cond delay="0"/>
-                            </p:stCondLst>
-                            <p:childTnLst>
-                              <p:par>
-                                <p:cTn id="19" presetID="1" presetClass="entr" presetSubtype="0" fill="hold" nodeType="clickEffect">
-                                  <p:stCondLst>
-                                    <p:cond delay="0"/>
-                                  </p:stCondLst>
-                                  <p:childTnLst>
-                                    <p:set>
-                                      <p:cBhvr>
-                                        <p:cTn id="20" dur="1" fill="hold">
-                                          <p:stCondLst>
-                                            <p:cond delay="0"/>
-                                          </p:stCondLst>
-                                        </p:cTn>
-                                        <p:tgtEl>
-                                          <p:spTgt spid="3">
-                                            <p:txEl>
-                                              <p:pRg st="6" end="6"/>
-                                            </p:txEl>
-                                          </p:spTgt>
-                                        </p:tgtEl>
-                                        <p:attrNameLst>
-                                          <p:attrName>style.visibility</p:attrName>
-                                        </p:attrNameLst>
-                                      </p:cBhvr>
-                                      <p:to>
-                                        <p:strVal val="visible"/>
-                                      </p:to>
-                                    </p:set>
-                                  </p:childTnLst>
-                                </p:cTn>
-                              </p:par>
-                              <p:par>
-                                <p:cTn id="21" presetID="1" presetClass="entr" presetSubtype="0" fill="hold" nodeType="withEffect">
-                                  <p:stCondLst>
-                                    <p:cond delay="0"/>
-                                  </p:stCondLst>
-                                  <p:childTnLst>
-                                    <p:set>
-                                      <p:cBhvr>
-                                        <p:cTn id="22" dur="1" fill="hold">
-                                          <p:stCondLst>
-                                            <p:cond delay="0"/>
-                                          </p:stCondLst>
-                                        </p:cTn>
-                                        <p:tgtEl>
-                                          <p:spTgt spid="3">
-                                            <p:txEl>
-                                              <p:pRg st="7" end="7"/>
-                                            </p:txEl>
-                                          </p:spTgt>
-                                        </p:tgtEl>
-                                        <p:attrNameLst>
-                                          <p:attrName>style.visibility</p:attrName>
-                                        </p:attrNameLst>
-                                      </p:cBhvr>
-                                      <p:to>
-                                        <p:strVal val="visible"/>
-                                      </p:to>
-                                    </p:set>
-                                  </p:childTnLst>
-                                </p:cTn>
-                              </p:par>
-                              <p:par>
-                                <p:cTn id="23" presetID="1" presetClass="entr" presetSubtype="0" fill="hold" nodeType="withEffect">
-                                  <p:stCondLst>
-                                    <p:cond delay="0"/>
-                                  </p:stCondLst>
-                                  <p:childTnLst>
-                                    <p:set>
-                                      <p:cBhvr>
-                                        <p:cTn id="24" dur="1" fill="hold">
-                                          <p:stCondLst>
-                                            <p:cond delay="0"/>
-                                          </p:stCondLst>
-                                        </p:cTn>
-                                        <p:tgtEl>
-                                          <p:spTgt spid="3">
-                                            <p:txEl>
-                                              <p:pRg st="8" end="8"/>
-                                            </p:txEl>
-                                          </p:spTgt>
-                                        </p:tgtEl>
-                                        <p:attrNameLst>
-                                          <p:attrName>style.visibility</p:attrName>
-                                        </p:attrNameLst>
-                                      </p:cBhvr>
-                                      <p:to>
-                                        <p:strVal val="visible"/>
-                                      </p:to>
-                                    </p:set>
-                                  </p:childTnLst>
-                                </p:cTn>
-                              </p:par>
-                              <p:par>
-                                <p:cTn id="25" presetID="1" presetClass="entr" presetSubtype="0" fill="hold" nodeType="withEffect">
-                                  <p:stCondLst>
-                                    <p:cond delay="0"/>
-                                  </p:stCondLst>
-                                  <p:childTnLst>
-                                    <p:set>
-                                      <p:cBhvr>
-                                        <p:cTn id="26" dur="1" fill="hold">
-                                          <p:stCondLst>
-                                            <p:cond delay="0"/>
-                                          </p:stCondLst>
-                                        </p:cTn>
-                                        <p:tgtEl>
-                                          <p:spTgt spid="3">
-                                            <p:txEl>
-                                              <p:pRg st="9" end="9"/>
-                                            </p:txEl>
-                                          </p:spTgt>
-                                        </p:tgtEl>
-                                        <p:attrNameLst>
-                                          <p:attrName>style.visibility</p:attrName>
-                                        </p:attrNameLst>
-                                      </p:cBhvr>
-                                      <p:to>
-                                        <p:strVal val="visible"/>
-                                      </p:to>
-                                    </p:set>
-                                  </p:childTnLst>
-                                </p:cTn>
-                              </p:par>
-                            </p:childTnLst>
-                          </p:cTn>
-                        </p:par>
-                      </p:childTnLst>
-                    </p:cTn>
-                  </p:par>
-                  <p:par>
-                    <p:cTn id="27" fill="hold">
-                      <p:stCondLst>
-                        <p:cond delay="indefinite"/>
-                      </p:stCondLst>
-                      <p:childTnLst>
-                        <p:par>
-                          <p:cTn id="28" fill="hold">
-                            <p:stCondLst>
-                              <p:cond delay="0"/>
-                            </p:stCondLst>
-                            <p:childTnLst>
-                              <p:par>
-                                <p:cTn id="29" presetID="1" presetClass="entr" presetSubtype="0" fill="hold" nodeType="clickEffect">
-                                  <p:stCondLst>
-                                    <p:cond delay="0"/>
-                                  </p:stCondLst>
-                                  <p:childTnLst>
-                                    <p:set>
-                                      <p:cBhvr>
-                                        <p:cTn id="30" dur="1" fill="hold">
-                                          <p:stCondLst>
-                                            <p:cond delay="0"/>
-                                          </p:stCondLst>
-                                        </p:cTn>
-                                        <p:tgtEl>
-                                          <p:spTgt spid="3">
-                                            <p:txEl>
-                                              <p:pRg st="10" end="10"/>
-                                            </p:txEl>
-                                          </p:spTgt>
-                                        </p:tgtEl>
-                                        <p:attrNameLst>
-                                          <p:attrName>style.visibility</p:attrName>
-                                        </p:attrNameLst>
-                                      </p:cBhvr>
-                                      <p:to>
-                                        <p:strVal val="visible"/>
-                                      </p:to>
-                                    </p:set>
-                                  </p:childTnLst>
-                                </p:cTn>
-                              </p:par>
-                              <p:par>
-                                <p:cTn id="31" presetID="1" presetClass="entr" presetSubtype="0" fill="hold" nodeType="withEffect">
-                                  <p:stCondLst>
-                                    <p:cond delay="0"/>
-                                  </p:stCondLst>
-                                  <p:childTnLst>
-                                    <p:set>
-                                      <p:cBhvr>
-                                        <p:cTn id="32" dur="1" fill="hold">
-                                          <p:stCondLst>
-                                            <p:cond delay="0"/>
-                                          </p:stCondLst>
-                                        </p:cTn>
-                                        <p:tgtEl>
-                                          <p:spTgt spid="3">
-                                            <p:txEl>
-                                              <p:pRg st="11" end="11"/>
-                                            </p:txEl>
-                                          </p:spTgt>
-                                        </p:tgtEl>
-                                        <p:attrNameLst>
-                                          <p:attrName>style.visibility</p:attrName>
-                                        </p:attrNameLst>
-                                      </p:cBhvr>
-                                      <p:to>
-                                        <p:strVal val="visible"/>
-                                      </p:to>
-                                    </p:set>
-                                  </p:childTnLst>
-                                </p:cTn>
-                              </p:par>
-                            </p:childTnLst>
-                          </p:cTn>
-                        </p:par>
-                      </p:childTnLst>
-                    </p:cTn>
-                  </p:par>
-                </p:childTnLst>
-              </p:cTn>
-              <p:prevCondLst>
-                <p:cond evt="onPrev" delay="0">
-                  <p:tgtEl>
-                    <p:sldTgt/>
-                  </p:tgtEl>
-                </p:cond>
-              </p:prevCondLst>
-              <p:nextCondLst>
-                <p:cond evt="onNext" delay="0">
-                  <p:tgtEl>
-                    <p:sldTgt/>
-                  </p:tgtEl>
-                </p:cond>
-              </p:nextCondLst>
-            </p:seq>
-          </p:childTnLst>
-        </p:cTn>
-      </p:par>
-    </p:tnLst>
-  </p:timing>
 </p:sld>
 </file>
 
@@ -24258,8 +23815,8 @@
           <a:chExt cx="0" cy="0"/>
         </a:xfrm>
       </p:grpSpPr>
-      <mc:AlternateContent xmlns:mc="http://schemas.openxmlformats.org/markup-compatibility/2006" xmlns:a14="http://schemas.microsoft.com/office/drawing/2010/main">
-        <mc:Choice Requires="a14">
+      <mc:AlternateContent xmlns:mc="http://schemas.openxmlformats.org/markup-compatibility/2006">
+        <mc:Choice xmlns:a14="http://schemas.microsoft.com/office/drawing/2010/main" Requires="a14">
           <p:sp>
             <p:nvSpPr>
               <p:cNvPr id="3" name="Content Placeholder 2">
@@ -24497,6 +24054,12 @@
                                   </a:rPr>
                                   <m:t>𝑖</m:t>
                                 </m:r>
+                                <m:r>
+                                  <a:rPr lang="en-US" b="0" i="1" smtClean="0">
+                                    <a:latin typeface="Cambria Math" panose="02040503050406030204" pitchFamily="18" charset="0"/>
+                                  </a:rPr>
+                                  <m:t>,.</m:t>
+                                </m:r>
                               </m:sub>
                             </m:sSub>
                           </m:e>
@@ -24556,6 +24119,12 @@
                                 </m:r>
                               </m:e>
                               <m:sub>
+                                <m:r>
+                                  <a:rPr lang="en-US" b="0" i="1" smtClean="0">
+                                    <a:latin typeface="Cambria Math" panose="02040503050406030204" pitchFamily="18" charset="0"/>
+                                  </a:rPr>
+                                  <m:t>.,</m:t>
+                                </m:r>
                                 <m:r>
                                   <a:rPr lang="en-US" b="0" i="1" smtClean="0">
                                     <a:latin typeface="Cambria Math" panose="02040503050406030204" pitchFamily="18" charset="0"/>
@@ -24663,6 +24232,12 @@
                                       </a:rPr>
                                       <m:t>𝑖</m:t>
                                     </m:r>
+                                    <m:r>
+                                      <a:rPr lang="en-US" b="0" i="1" smtClean="0">
+                                        <a:latin typeface="Cambria Math" panose="02040503050406030204" pitchFamily="18" charset="0"/>
+                                      </a:rPr>
+                                      <m:t>,.</m:t>
+                                    </m:r>
                                   </m:sub>
                                 </m:sSub>
                                 <m:r>
@@ -24688,6 +24263,12 @@
                                     </m:r>
                                   </m:e>
                                   <m:sub>
+                                    <m:r>
+                                      <a:rPr lang="en-US" b="0" i="1" smtClean="0">
+                                        <a:latin typeface="Cambria Math" panose="02040503050406030204" pitchFamily="18" charset="0"/>
+                                      </a:rPr>
+                                      <m:t>.,</m:t>
+                                    </m:r>
                                     <m:r>
                                       <a:rPr lang="en-US" i="1">
                                         <a:latin typeface="Cambria Math" panose="02040503050406030204" pitchFamily="18" charset="0"/>
@@ -24856,7 +24437,7 @@
             </p:txBody>
           </p:sp>
         </mc:Choice>
-        <mc:Fallback xmlns="">
+        <mc:Fallback>
           <p:sp>
             <p:nvSpPr>
               <p:cNvPr id="3" name="Content Placeholder 2">
@@ -24966,387 +24547,6 @@
   <p:clrMapOvr>
     <a:masterClrMapping/>
   </p:clrMapOvr>
-  <p:timing>
-    <p:tnLst>
-      <p:par>
-        <p:cTn id="1" dur="indefinite" restart="never" nodeType="tmRoot">
-          <p:childTnLst>
-            <p:seq concurrent="1" nextAc="seek">
-              <p:cTn id="2" dur="indefinite" nodeType="mainSeq">
-                <p:childTnLst>
-                  <p:par>
-                    <p:cTn id="3" fill="hold">
-                      <p:stCondLst>
-                        <p:cond delay="indefinite"/>
-                      </p:stCondLst>
-                      <p:childTnLst>
-                        <p:par>
-                          <p:cTn id="4" fill="hold">
-                            <p:stCondLst>
-                              <p:cond delay="0"/>
-                            </p:stCondLst>
-                            <p:childTnLst>
-                              <p:par>
-                                <p:cTn id="5" presetID="1" presetClass="entr" presetSubtype="0" fill="hold" nodeType="clickEffect">
-                                  <p:stCondLst>
-                                    <p:cond delay="0"/>
-                                  </p:stCondLst>
-                                  <p:childTnLst>
-                                    <p:set>
-                                      <p:cBhvr>
-                                        <p:cTn id="6" dur="1" fill="hold">
-                                          <p:stCondLst>
-                                            <p:cond delay="0"/>
-                                          </p:stCondLst>
-                                        </p:cTn>
-                                        <p:tgtEl>
-                                          <p:spTgt spid="3">
-                                            <p:txEl>
-                                              <p:pRg st="1" end="1"/>
-                                            </p:txEl>
-                                          </p:spTgt>
-                                        </p:tgtEl>
-                                        <p:attrNameLst>
-                                          <p:attrName>style.visibility</p:attrName>
-                                        </p:attrNameLst>
-                                      </p:cBhvr>
-                                      <p:to>
-                                        <p:strVal val="visible"/>
-                                      </p:to>
-                                    </p:set>
-                                  </p:childTnLst>
-                                </p:cTn>
-                              </p:par>
-                            </p:childTnLst>
-                          </p:cTn>
-                        </p:par>
-                      </p:childTnLst>
-                    </p:cTn>
-                  </p:par>
-                  <p:par>
-                    <p:cTn id="7" fill="hold">
-                      <p:stCondLst>
-                        <p:cond delay="indefinite"/>
-                      </p:stCondLst>
-                      <p:childTnLst>
-                        <p:par>
-                          <p:cTn id="8" fill="hold">
-                            <p:stCondLst>
-                              <p:cond delay="0"/>
-                            </p:stCondLst>
-                            <p:childTnLst>
-                              <p:par>
-                                <p:cTn id="9" presetID="1" presetClass="entr" presetSubtype="0" fill="hold" nodeType="clickEffect">
-                                  <p:stCondLst>
-                                    <p:cond delay="0"/>
-                                  </p:stCondLst>
-                                  <p:childTnLst>
-                                    <p:set>
-                                      <p:cBhvr>
-                                        <p:cTn id="10" dur="1" fill="hold">
-                                          <p:stCondLst>
-                                            <p:cond delay="0"/>
-                                          </p:stCondLst>
-                                        </p:cTn>
-                                        <p:tgtEl>
-                                          <p:spTgt spid="3">
-                                            <p:txEl>
-                                              <p:pRg st="2" end="2"/>
-                                            </p:txEl>
-                                          </p:spTgt>
-                                        </p:tgtEl>
-                                        <p:attrNameLst>
-                                          <p:attrName>style.visibility</p:attrName>
-                                        </p:attrNameLst>
-                                      </p:cBhvr>
-                                      <p:to>
-                                        <p:strVal val="visible"/>
-                                      </p:to>
-                                    </p:set>
-                                  </p:childTnLst>
-                                </p:cTn>
-                              </p:par>
-                              <p:par>
-                                <p:cTn id="11" presetID="1" presetClass="entr" presetSubtype="0" fill="hold" nodeType="withEffect">
-                                  <p:stCondLst>
-                                    <p:cond delay="0"/>
-                                  </p:stCondLst>
-                                  <p:childTnLst>
-                                    <p:set>
-                                      <p:cBhvr>
-                                        <p:cTn id="12" dur="1" fill="hold">
-                                          <p:stCondLst>
-                                            <p:cond delay="0"/>
-                                          </p:stCondLst>
-                                        </p:cTn>
-                                        <p:tgtEl>
-                                          <p:spTgt spid="3">
-                                            <p:txEl>
-                                              <p:pRg st="3" end="3"/>
-                                            </p:txEl>
-                                          </p:spTgt>
-                                        </p:tgtEl>
-                                        <p:attrNameLst>
-                                          <p:attrName>style.visibility</p:attrName>
-                                        </p:attrNameLst>
-                                      </p:cBhvr>
-                                      <p:to>
-                                        <p:strVal val="visible"/>
-                                      </p:to>
-                                    </p:set>
-                                  </p:childTnLst>
-                                </p:cTn>
-                              </p:par>
-                              <p:par>
-                                <p:cTn id="13" presetID="1" presetClass="entr" presetSubtype="0" fill="hold" nodeType="withEffect">
-                                  <p:stCondLst>
-                                    <p:cond delay="0"/>
-                                  </p:stCondLst>
-                                  <p:childTnLst>
-                                    <p:set>
-                                      <p:cBhvr>
-                                        <p:cTn id="14" dur="1" fill="hold">
-                                          <p:stCondLst>
-                                            <p:cond delay="0"/>
-                                          </p:stCondLst>
-                                        </p:cTn>
-                                        <p:tgtEl>
-                                          <p:spTgt spid="3">
-                                            <p:txEl>
-                                              <p:pRg st="4" end="4"/>
-                                            </p:txEl>
-                                          </p:spTgt>
-                                        </p:tgtEl>
-                                        <p:attrNameLst>
-                                          <p:attrName>style.visibility</p:attrName>
-                                        </p:attrNameLst>
-                                      </p:cBhvr>
-                                      <p:to>
-                                        <p:strVal val="visible"/>
-                                      </p:to>
-                                    </p:set>
-                                  </p:childTnLst>
-                                </p:cTn>
-                              </p:par>
-                            </p:childTnLst>
-                          </p:cTn>
-                        </p:par>
-                      </p:childTnLst>
-                    </p:cTn>
-                  </p:par>
-                  <p:par>
-                    <p:cTn id="15" fill="hold">
-                      <p:stCondLst>
-                        <p:cond delay="indefinite"/>
-                      </p:stCondLst>
-                      <p:childTnLst>
-                        <p:par>
-                          <p:cTn id="16" fill="hold">
-                            <p:stCondLst>
-                              <p:cond delay="0"/>
-                            </p:stCondLst>
-                            <p:childTnLst>
-                              <p:par>
-                                <p:cTn id="17" presetID="1" presetClass="entr" presetSubtype="0" fill="hold" nodeType="clickEffect">
-                                  <p:stCondLst>
-                                    <p:cond delay="0"/>
-                                  </p:stCondLst>
-                                  <p:childTnLst>
-                                    <p:set>
-                                      <p:cBhvr>
-                                        <p:cTn id="18" dur="1" fill="hold">
-                                          <p:stCondLst>
-                                            <p:cond delay="0"/>
-                                          </p:stCondLst>
-                                        </p:cTn>
-                                        <p:tgtEl>
-                                          <p:spTgt spid="3">
-                                            <p:txEl>
-                                              <p:pRg st="5" end="5"/>
-                                            </p:txEl>
-                                          </p:spTgt>
-                                        </p:tgtEl>
-                                        <p:attrNameLst>
-                                          <p:attrName>style.visibility</p:attrName>
-                                        </p:attrNameLst>
-                                      </p:cBhvr>
-                                      <p:to>
-                                        <p:strVal val="visible"/>
-                                      </p:to>
-                                    </p:set>
-                                  </p:childTnLst>
-                                </p:cTn>
-                              </p:par>
-                              <p:par>
-                                <p:cTn id="19" presetID="1" presetClass="entr" presetSubtype="0" fill="hold" nodeType="withEffect">
-                                  <p:stCondLst>
-                                    <p:cond delay="0"/>
-                                  </p:stCondLst>
-                                  <p:childTnLst>
-                                    <p:set>
-                                      <p:cBhvr>
-                                        <p:cTn id="20" dur="1" fill="hold">
-                                          <p:stCondLst>
-                                            <p:cond delay="0"/>
-                                          </p:stCondLst>
-                                        </p:cTn>
-                                        <p:tgtEl>
-                                          <p:spTgt spid="3">
-                                            <p:txEl>
-                                              <p:pRg st="6" end="6"/>
-                                            </p:txEl>
-                                          </p:spTgt>
-                                        </p:tgtEl>
-                                        <p:attrNameLst>
-                                          <p:attrName>style.visibility</p:attrName>
-                                        </p:attrNameLst>
-                                      </p:cBhvr>
-                                      <p:to>
-                                        <p:strVal val="visible"/>
-                                      </p:to>
-                                    </p:set>
-                                  </p:childTnLst>
-                                </p:cTn>
-                              </p:par>
-                              <p:par>
-                                <p:cTn id="21" presetID="1" presetClass="entr" presetSubtype="0" fill="hold" nodeType="withEffect">
-                                  <p:stCondLst>
-                                    <p:cond delay="0"/>
-                                  </p:stCondLst>
-                                  <p:childTnLst>
-                                    <p:set>
-                                      <p:cBhvr>
-                                        <p:cTn id="22" dur="1" fill="hold">
-                                          <p:stCondLst>
-                                            <p:cond delay="0"/>
-                                          </p:stCondLst>
-                                        </p:cTn>
-                                        <p:tgtEl>
-                                          <p:spTgt spid="3">
-                                            <p:txEl>
-                                              <p:pRg st="7" end="7"/>
-                                            </p:txEl>
-                                          </p:spTgt>
-                                        </p:tgtEl>
-                                        <p:attrNameLst>
-                                          <p:attrName>style.visibility</p:attrName>
-                                        </p:attrNameLst>
-                                      </p:cBhvr>
-                                      <p:to>
-                                        <p:strVal val="visible"/>
-                                      </p:to>
-                                    </p:set>
-                                  </p:childTnLst>
-                                </p:cTn>
-                              </p:par>
-                              <p:par>
-                                <p:cTn id="23" presetID="1" presetClass="entr" presetSubtype="0" fill="hold" nodeType="withEffect">
-                                  <p:stCondLst>
-                                    <p:cond delay="0"/>
-                                  </p:stCondLst>
-                                  <p:childTnLst>
-                                    <p:set>
-                                      <p:cBhvr>
-                                        <p:cTn id="24" dur="1" fill="hold">
-                                          <p:stCondLst>
-                                            <p:cond delay="0"/>
-                                          </p:stCondLst>
-                                        </p:cTn>
-                                        <p:tgtEl>
-                                          <p:spTgt spid="3">
-                                            <p:txEl>
-                                              <p:pRg st="8" end="8"/>
-                                            </p:txEl>
-                                          </p:spTgt>
-                                        </p:tgtEl>
-                                        <p:attrNameLst>
-                                          <p:attrName>style.visibility</p:attrName>
-                                        </p:attrNameLst>
-                                      </p:cBhvr>
-                                      <p:to>
-                                        <p:strVal val="visible"/>
-                                      </p:to>
-                                    </p:set>
-                                  </p:childTnLst>
-                                </p:cTn>
-                              </p:par>
-                            </p:childTnLst>
-                          </p:cTn>
-                        </p:par>
-                      </p:childTnLst>
-                    </p:cTn>
-                  </p:par>
-                  <p:par>
-                    <p:cTn id="25" fill="hold">
-                      <p:stCondLst>
-                        <p:cond delay="indefinite"/>
-                      </p:stCondLst>
-                      <p:childTnLst>
-                        <p:par>
-                          <p:cTn id="26" fill="hold">
-                            <p:stCondLst>
-                              <p:cond delay="0"/>
-                            </p:stCondLst>
-                            <p:childTnLst>
-                              <p:par>
-                                <p:cTn id="27" presetID="1" presetClass="entr" presetSubtype="0" fill="hold" nodeType="clickEffect">
-                                  <p:stCondLst>
-                                    <p:cond delay="0"/>
-                                  </p:stCondLst>
-                                  <p:childTnLst>
-                                    <p:set>
-                                      <p:cBhvr>
-                                        <p:cTn id="28" dur="1" fill="hold">
-                                          <p:stCondLst>
-                                            <p:cond delay="0"/>
-                                          </p:stCondLst>
-                                        </p:cTn>
-                                        <p:tgtEl>
-                                          <p:spTgt spid="3">
-                                            <p:txEl>
-                                              <p:pRg st="9" end="9"/>
-                                            </p:txEl>
-                                          </p:spTgt>
-                                        </p:tgtEl>
-                                        <p:attrNameLst>
-                                          <p:attrName>style.visibility</p:attrName>
-                                        </p:attrNameLst>
-                                      </p:cBhvr>
-                                      <p:to>
-                                        <p:strVal val="visible"/>
-                                      </p:to>
-                                    </p:set>
-                                  </p:childTnLst>
-                                </p:cTn>
-                              </p:par>
-                            </p:childTnLst>
-                          </p:cTn>
-                        </p:par>
-                      </p:childTnLst>
-                    </p:cTn>
-                  </p:par>
-                </p:childTnLst>
-              </p:cTn>
-              <p:prevCondLst>
-                <p:cond evt="onPrev" delay="0">
-                  <p:tgtEl>
-                    <p:sldTgt/>
-                  </p:tgtEl>
-                </p:cond>
-              </p:prevCondLst>
-              <p:nextCondLst>
-                <p:cond evt="onNext" delay="0">
-                  <p:tgtEl>
-                    <p:sldTgt/>
-                  </p:tgtEl>
-                </p:cond>
-              </p:nextCondLst>
-            </p:seq>
-          </p:childTnLst>
-        </p:cTn>
-      </p:par>
-    </p:tnLst>
-  </p:timing>
 </p:sld>
 </file>
 
@@ -25367,8 +24567,8 @@
           <a:chExt cx="0" cy="0"/>
         </a:xfrm>
       </p:grpSpPr>
-      <mc:AlternateContent xmlns:mc="http://schemas.openxmlformats.org/markup-compatibility/2006" xmlns:a14="http://schemas.microsoft.com/office/drawing/2010/main">
-        <mc:Choice Requires="a14">
+      <mc:AlternateContent xmlns:mc="http://schemas.openxmlformats.org/markup-compatibility/2006">
+        <mc:Choice xmlns:a14="http://schemas.microsoft.com/office/drawing/2010/main" Requires="a14">
           <p:sp>
             <p:nvSpPr>
               <p:cNvPr id="3" name="Content Placeholder 2">
@@ -25704,6 +24904,12 @@
                                   </a:rPr>
                                   <m:t>𝑖</m:t>
                                 </m:r>
+                                <m:r>
+                                  <a:rPr lang="en-US" b="0" i="1" smtClean="0">
+                                    <a:latin typeface="Cambria Math" panose="02040503050406030204" pitchFamily="18" charset="0"/>
+                                  </a:rPr>
+                                  <m:t>,.</m:t>
+                                </m:r>
                               </m:sub>
                             </m:sSub>
                           </m:e>
@@ -25763,6 +24969,12 @@
                                 </m:r>
                               </m:e>
                               <m:sub>
+                                <m:r>
+                                  <a:rPr lang="en-US" b="0" i="1" smtClean="0">
+                                    <a:latin typeface="Cambria Math" panose="02040503050406030204" pitchFamily="18" charset="0"/>
+                                  </a:rPr>
+                                  <m:t>.,</m:t>
+                                </m:r>
                                 <m:r>
                                   <a:rPr lang="en-US" b="0" i="1" smtClean="0">
                                     <a:latin typeface="Cambria Math" panose="02040503050406030204" pitchFamily="18" charset="0"/>
@@ -25868,6 +25080,12 @@
                               </a:rPr>
                               <m:t>𝑖</m:t>
                             </m:r>
+                            <m:r>
+                              <a:rPr lang="en-US" b="0" i="1" smtClean="0">
+                                <a:latin typeface="Cambria Math" panose="02040503050406030204" pitchFamily="18" charset="0"/>
+                              </a:rPr>
+                              <m:t>,.</m:t>
+                            </m:r>
                           </m:sub>
                         </m:sSub>
                         <m:r>
@@ -25893,6 +25111,12 @@
                             </m:r>
                           </m:e>
                           <m:sub>
+                            <m:r>
+                              <a:rPr lang="en-US" b="0" i="1" smtClean="0">
+                                <a:latin typeface="Cambria Math" panose="02040503050406030204" pitchFamily="18" charset="0"/>
+                              </a:rPr>
+                              <m:t>.,</m:t>
+                            </m:r>
                             <m:r>
                               <a:rPr lang="en-US" i="1">
                                 <a:latin typeface="Cambria Math" panose="02040503050406030204" pitchFamily="18" charset="0"/>
@@ -26119,7 +25343,7 @@
             </p:txBody>
           </p:sp>
         </mc:Choice>
-        <mc:Fallback xmlns="">
+        <mc:Fallback>
           <p:sp>
             <p:nvSpPr>
               <p:cNvPr id="3" name="Content Placeholder 2">
@@ -26229,418 +25453,6 @@
   <p:clrMapOvr>
     <a:masterClrMapping/>
   </p:clrMapOvr>
-  <p:timing>
-    <p:tnLst>
-      <p:par>
-        <p:cTn id="1" dur="indefinite" restart="never" nodeType="tmRoot">
-          <p:childTnLst>
-            <p:seq concurrent="1" nextAc="seek">
-              <p:cTn id="2" dur="indefinite" nodeType="mainSeq">
-                <p:childTnLst>
-                  <p:par>
-                    <p:cTn id="3" fill="hold">
-                      <p:stCondLst>
-                        <p:cond delay="indefinite"/>
-                      </p:stCondLst>
-                      <p:childTnLst>
-                        <p:par>
-                          <p:cTn id="4" fill="hold">
-                            <p:stCondLst>
-                              <p:cond delay="0"/>
-                            </p:stCondLst>
-                            <p:childTnLst>
-                              <p:par>
-                                <p:cTn id="5" presetID="1" presetClass="entr" presetSubtype="0" fill="hold" nodeType="clickEffect">
-                                  <p:stCondLst>
-                                    <p:cond delay="0"/>
-                                  </p:stCondLst>
-                                  <p:childTnLst>
-                                    <p:set>
-                                      <p:cBhvr>
-                                        <p:cTn id="6" dur="1" fill="hold">
-                                          <p:stCondLst>
-                                            <p:cond delay="0"/>
-                                          </p:stCondLst>
-                                        </p:cTn>
-                                        <p:tgtEl>
-                                          <p:spTgt spid="3">
-                                            <p:txEl>
-                                              <p:pRg st="1" end="1"/>
-                                            </p:txEl>
-                                          </p:spTgt>
-                                        </p:tgtEl>
-                                        <p:attrNameLst>
-                                          <p:attrName>style.visibility</p:attrName>
-                                        </p:attrNameLst>
-                                      </p:cBhvr>
-                                      <p:to>
-                                        <p:strVal val="visible"/>
-                                      </p:to>
-                                    </p:set>
-                                  </p:childTnLst>
-                                </p:cTn>
-                              </p:par>
-                            </p:childTnLst>
-                          </p:cTn>
-                        </p:par>
-                      </p:childTnLst>
-                    </p:cTn>
-                  </p:par>
-                  <p:par>
-                    <p:cTn id="7" fill="hold">
-                      <p:stCondLst>
-                        <p:cond delay="indefinite"/>
-                      </p:stCondLst>
-                      <p:childTnLst>
-                        <p:par>
-                          <p:cTn id="8" fill="hold">
-                            <p:stCondLst>
-                              <p:cond delay="0"/>
-                            </p:stCondLst>
-                            <p:childTnLst>
-                              <p:par>
-                                <p:cTn id="9" presetID="1" presetClass="entr" presetSubtype="0" fill="hold" nodeType="clickEffect">
-                                  <p:stCondLst>
-                                    <p:cond delay="0"/>
-                                  </p:stCondLst>
-                                  <p:childTnLst>
-                                    <p:set>
-                                      <p:cBhvr>
-                                        <p:cTn id="10" dur="1" fill="hold">
-                                          <p:stCondLst>
-                                            <p:cond delay="0"/>
-                                          </p:stCondLst>
-                                        </p:cTn>
-                                        <p:tgtEl>
-                                          <p:spTgt spid="3">
-                                            <p:txEl>
-                                              <p:pRg st="2" end="2"/>
-                                            </p:txEl>
-                                          </p:spTgt>
-                                        </p:tgtEl>
-                                        <p:attrNameLst>
-                                          <p:attrName>style.visibility</p:attrName>
-                                        </p:attrNameLst>
-                                      </p:cBhvr>
-                                      <p:to>
-                                        <p:strVal val="visible"/>
-                                      </p:to>
-                                    </p:set>
-                                  </p:childTnLst>
-                                </p:cTn>
-                              </p:par>
-                              <p:par>
-                                <p:cTn id="11" presetID="1" presetClass="entr" presetSubtype="0" fill="hold" nodeType="withEffect">
-                                  <p:stCondLst>
-                                    <p:cond delay="0"/>
-                                  </p:stCondLst>
-                                  <p:childTnLst>
-                                    <p:set>
-                                      <p:cBhvr>
-                                        <p:cTn id="12" dur="1" fill="hold">
-                                          <p:stCondLst>
-                                            <p:cond delay="0"/>
-                                          </p:stCondLst>
-                                        </p:cTn>
-                                        <p:tgtEl>
-                                          <p:spTgt spid="3">
-                                            <p:txEl>
-                                              <p:pRg st="3" end="3"/>
-                                            </p:txEl>
-                                          </p:spTgt>
-                                        </p:tgtEl>
-                                        <p:attrNameLst>
-                                          <p:attrName>style.visibility</p:attrName>
-                                        </p:attrNameLst>
-                                      </p:cBhvr>
-                                      <p:to>
-                                        <p:strVal val="visible"/>
-                                      </p:to>
-                                    </p:set>
-                                  </p:childTnLst>
-                                </p:cTn>
-                              </p:par>
-                              <p:par>
-                                <p:cTn id="13" presetID="1" presetClass="entr" presetSubtype="0" fill="hold" nodeType="withEffect">
-                                  <p:stCondLst>
-                                    <p:cond delay="0"/>
-                                  </p:stCondLst>
-                                  <p:childTnLst>
-                                    <p:set>
-                                      <p:cBhvr>
-                                        <p:cTn id="14" dur="1" fill="hold">
-                                          <p:stCondLst>
-                                            <p:cond delay="0"/>
-                                          </p:stCondLst>
-                                        </p:cTn>
-                                        <p:tgtEl>
-                                          <p:spTgt spid="3">
-                                            <p:txEl>
-                                              <p:pRg st="4" end="4"/>
-                                            </p:txEl>
-                                          </p:spTgt>
-                                        </p:tgtEl>
-                                        <p:attrNameLst>
-                                          <p:attrName>style.visibility</p:attrName>
-                                        </p:attrNameLst>
-                                      </p:cBhvr>
-                                      <p:to>
-                                        <p:strVal val="visible"/>
-                                      </p:to>
-                                    </p:set>
-                                  </p:childTnLst>
-                                </p:cTn>
-                              </p:par>
-                            </p:childTnLst>
-                          </p:cTn>
-                        </p:par>
-                      </p:childTnLst>
-                    </p:cTn>
-                  </p:par>
-                  <p:par>
-                    <p:cTn id="15" fill="hold">
-                      <p:stCondLst>
-                        <p:cond delay="indefinite"/>
-                      </p:stCondLst>
-                      <p:childTnLst>
-                        <p:par>
-                          <p:cTn id="16" fill="hold">
-                            <p:stCondLst>
-                              <p:cond delay="0"/>
-                            </p:stCondLst>
-                            <p:childTnLst>
-                              <p:par>
-                                <p:cTn id="17" presetID="1" presetClass="entr" presetSubtype="0" fill="hold" nodeType="clickEffect">
-                                  <p:stCondLst>
-                                    <p:cond delay="0"/>
-                                  </p:stCondLst>
-                                  <p:childTnLst>
-                                    <p:set>
-                                      <p:cBhvr>
-                                        <p:cTn id="18" dur="1" fill="hold">
-                                          <p:stCondLst>
-                                            <p:cond delay="0"/>
-                                          </p:stCondLst>
-                                        </p:cTn>
-                                        <p:tgtEl>
-                                          <p:spTgt spid="3">
-                                            <p:txEl>
-                                              <p:pRg st="5" end="5"/>
-                                            </p:txEl>
-                                          </p:spTgt>
-                                        </p:tgtEl>
-                                        <p:attrNameLst>
-                                          <p:attrName>style.visibility</p:attrName>
-                                        </p:attrNameLst>
-                                      </p:cBhvr>
-                                      <p:to>
-                                        <p:strVal val="visible"/>
-                                      </p:to>
-                                    </p:set>
-                                  </p:childTnLst>
-                                </p:cTn>
-                              </p:par>
-                              <p:par>
-                                <p:cTn id="19" presetID="1" presetClass="entr" presetSubtype="0" fill="hold" nodeType="withEffect">
-                                  <p:stCondLst>
-                                    <p:cond delay="0"/>
-                                  </p:stCondLst>
-                                  <p:childTnLst>
-                                    <p:set>
-                                      <p:cBhvr>
-                                        <p:cTn id="20" dur="1" fill="hold">
-                                          <p:stCondLst>
-                                            <p:cond delay="0"/>
-                                          </p:stCondLst>
-                                        </p:cTn>
-                                        <p:tgtEl>
-                                          <p:spTgt spid="3">
-                                            <p:txEl>
-                                              <p:pRg st="6" end="6"/>
-                                            </p:txEl>
-                                          </p:spTgt>
-                                        </p:tgtEl>
-                                        <p:attrNameLst>
-                                          <p:attrName>style.visibility</p:attrName>
-                                        </p:attrNameLst>
-                                      </p:cBhvr>
-                                      <p:to>
-                                        <p:strVal val="visible"/>
-                                      </p:to>
-                                    </p:set>
-                                  </p:childTnLst>
-                                </p:cTn>
-                              </p:par>
-                              <p:par>
-                                <p:cTn id="21" presetID="1" presetClass="entr" presetSubtype="0" fill="hold" nodeType="withEffect">
-                                  <p:stCondLst>
-                                    <p:cond delay="0"/>
-                                  </p:stCondLst>
-                                  <p:childTnLst>
-                                    <p:set>
-                                      <p:cBhvr>
-                                        <p:cTn id="22" dur="1" fill="hold">
-                                          <p:stCondLst>
-                                            <p:cond delay="0"/>
-                                          </p:stCondLst>
-                                        </p:cTn>
-                                        <p:tgtEl>
-                                          <p:spTgt spid="3">
-                                            <p:txEl>
-                                              <p:pRg st="7" end="7"/>
-                                            </p:txEl>
-                                          </p:spTgt>
-                                        </p:tgtEl>
-                                        <p:attrNameLst>
-                                          <p:attrName>style.visibility</p:attrName>
-                                        </p:attrNameLst>
-                                      </p:cBhvr>
-                                      <p:to>
-                                        <p:strVal val="visible"/>
-                                      </p:to>
-                                    </p:set>
-                                  </p:childTnLst>
-                                </p:cTn>
-                              </p:par>
-                              <p:par>
-                                <p:cTn id="23" presetID="1" presetClass="entr" presetSubtype="0" fill="hold" nodeType="withEffect">
-                                  <p:stCondLst>
-                                    <p:cond delay="0"/>
-                                  </p:stCondLst>
-                                  <p:childTnLst>
-                                    <p:set>
-                                      <p:cBhvr>
-                                        <p:cTn id="24" dur="1" fill="hold">
-                                          <p:stCondLst>
-                                            <p:cond delay="0"/>
-                                          </p:stCondLst>
-                                        </p:cTn>
-                                        <p:tgtEl>
-                                          <p:spTgt spid="3">
-                                            <p:txEl>
-                                              <p:pRg st="8" end="8"/>
-                                            </p:txEl>
-                                          </p:spTgt>
-                                        </p:tgtEl>
-                                        <p:attrNameLst>
-                                          <p:attrName>style.visibility</p:attrName>
-                                        </p:attrNameLst>
-                                      </p:cBhvr>
-                                      <p:to>
-                                        <p:strVal val="visible"/>
-                                      </p:to>
-                                    </p:set>
-                                  </p:childTnLst>
-                                </p:cTn>
-                              </p:par>
-                              <p:par>
-                                <p:cTn id="25" presetID="1" presetClass="entr" presetSubtype="0" fill="hold" nodeType="withEffect">
-                                  <p:stCondLst>
-                                    <p:cond delay="0"/>
-                                  </p:stCondLst>
-                                  <p:childTnLst>
-                                    <p:set>
-                                      <p:cBhvr>
-                                        <p:cTn id="26" dur="1" fill="hold">
-                                          <p:stCondLst>
-                                            <p:cond delay="0"/>
-                                          </p:stCondLst>
-                                        </p:cTn>
-                                        <p:tgtEl>
-                                          <p:spTgt spid="3">
-                                            <p:txEl>
-                                              <p:pRg st="9" end="9"/>
-                                            </p:txEl>
-                                          </p:spTgt>
-                                        </p:tgtEl>
-                                        <p:attrNameLst>
-                                          <p:attrName>style.visibility</p:attrName>
-                                        </p:attrNameLst>
-                                      </p:cBhvr>
-                                      <p:to>
-                                        <p:strVal val="visible"/>
-                                      </p:to>
-                                    </p:set>
-                                  </p:childTnLst>
-                                </p:cTn>
-                              </p:par>
-                            </p:childTnLst>
-                          </p:cTn>
-                        </p:par>
-                      </p:childTnLst>
-                    </p:cTn>
-                  </p:par>
-                  <p:par>
-                    <p:cTn id="27" fill="hold">
-                      <p:stCondLst>
-                        <p:cond delay="indefinite"/>
-                      </p:stCondLst>
-                      <p:childTnLst>
-                        <p:par>
-                          <p:cTn id="28" fill="hold">
-                            <p:stCondLst>
-                              <p:cond delay="0"/>
-                            </p:stCondLst>
-                            <p:childTnLst>
-                              <p:par>
-                                <p:cTn id="29" presetID="1" presetClass="entr" presetSubtype="0" fill="hold" nodeType="clickEffect">
-                                  <p:stCondLst>
-                                    <p:cond delay="0"/>
-                                  </p:stCondLst>
-                                  <p:childTnLst>
-                                    <p:set>
-                                      <p:cBhvr>
-                                        <p:cTn id="30" dur="1" fill="hold">
-                                          <p:stCondLst>
-                                            <p:cond delay="0"/>
-                                          </p:stCondLst>
-                                        </p:cTn>
-                                        <p:tgtEl>
-                                          <p:spTgt spid="3">
-                                            <p:txEl>
-                                              <p:pRg st="10" end="10"/>
-                                            </p:txEl>
-                                          </p:spTgt>
-                                        </p:tgtEl>
-                                        <p:attrNameLst>
-                                          <p:attrName>style.visibility</p:attrName>
-                                        </p:attrNameLst>
-                                      </p:cBhvr>
-                                      <p:to>
-                                        <p:strVal val="visible"/>
-                                      </p:to>
-                                    </p:set>
-                                  </p:childTnLst>
-                                </p:cTn>
-                              </p:par>
-                            </p:childTnLst>
-                          </p:cTn>
-                        </p:par>
-                      </p:childTnLst>
-                    </p:cTn>
-                  </p:par>
-                </p:childTnLst>
-              </p:cTn>
-              <p:prevCondLst>
-                <p:cond evt="onPrev" delay="0">
-                  <p:tgtEl>
-                    <p:sldTgt/>
-                  </p:tgtEl>
-                </p:cond>
-              </p:prevCondLst>
-              <p:nextCondLst>
-                <p:cond evt="onNext" delay="0">
-                  <p:tgtEl>
-                    <p:sldTgt/>
-                  </p:tgtEl>
-                </p:cond>
-              </p:nextCondLst>
-            </p:seq>
-          </p:childTnLst>
-        </p:cTn>
-      </p:par>
-    </p:tnLst>
-  </p:timing>
 </p:sld>
 </file>
 
@@ -29299,8 +28111,8 @@
           <a:chExt cx="0" cy="0"/>
         </a:xfrm>
       </p:grpSpPr>
-      <mc:AlternateContent xmlns:mc="http://schemas.openxmlformats.org/markup-compatibility/2006">
-        <mc:Choice xmlns:a14="http://schemas.microsoft.com/office/drawing/2010/main" Requires="a14">
+      <mc:AlternateContent xmlns:mc="http://schemas.openxmlformats.org/markup-compatibility/2006" xmlns:a14="http://schemas.microsoft.com/office/drawing/2010/main">
+        <mc:Choice Requires="a14">
           <p:sp>
             <p:nvSpPr>
               <p:cNvPr id="3" name="Content Placeholder 2">
@@ -29858,7 +28670,7 @@
             </p:txBody>
           </p:sp>
         </mc:Choice>
-        <mc:Fallback>
+        <mc:Fallback xmlns="">
           <p:sp>
             <p:nvSpPr>
               <p:cNvPr id="3" name="Content Placeholder 2">

</xml_diff>

<commit_message>
Minor corrections to slides
</commit_message>
<xml_diff>
--- a/slides/2_BigDataComputing.pptx
+++ b/slides/2_BigDataComputing.pptx
@@ -242,7 +242,7 @@
           <a:p>
             <a:fld id="{2F3ABF1A-8818-4472-8518-E71DC7B5D2F7}" type="datetimeFigureOut">
               <a:rPr lang="en-US" smtClean="0"/>
-              <a:t>6/25/2023</a:t>
+              <a:t>6/26/2023</a:t>
             </a:fld>
             <a:endParaRPr lang="en-US"/>
           </a:p>
@@ -827,7 +827,7 @@
           <a:p>
             <a:fld id="{6E4A31BF-7266-4BEB-918B-ADC21C630A6F}" type="datetimeFigureOut">
               <a:rPr lang="en-US" smtClean="0"/>
-              <a:t>6/25/2023</a:t>
+              <a:t>6/26/2023</a:t>
             </a:fld>
             <a:endParaRPr lang="en-US"/>
           </a:p>
@@ -1025,7 +1025,7 @@
           <a:p>
             <a:fld id="{6E4A31BF-7266-4BEB-918B-ADC21C630A6F}" type="datetimeFigureOut">
               <a:rPr lang="en-US" smtClean="0"/>
-              <a:t>6/25/2023</a:t>
+              <a:t>6/26/2023</a:t>
             </a:fld>
             <a:endParaRPr lang="en-US"/>
           </a:p>
@@ -1233,7 +1233,7 @@
           <a:p>
             <a:fld id="{6E4A31BF-7266-4BEB-918B-ADC21C630A6F}" type="datetimeFigureOut">
               <a:rPr lang="en-US" smtClean="0"/>
-              <a:t>6/25/2023</a:t>
+              <a:t>6/26/2023</a:t>
             </a:fld>
             <a:endParaRPr lang="en-US"/>
           </a:p>
@@ -1431,7 +1431,7 @@
           <a:p>
             <a:fld id="{6E4A31BF-7266-4BEB-918B-ADC21C630A6F}" type="datetimeFigureOut">
               <a:rPr lang="en-US" smtClean="0"/>
-              <a:t>6/25/2023</a:t>
+              <a:t>6/26/2023</a:t>
             </a:fld>
             <a:endParaRPr lang="en-US"/>
           </a:p>
@@ -1706,7 +1706,7 @@
           <a:p>
             <a:fld id="{6E4A31BF-7266-4BEB-918B-ADC21C630A6F}" type="datetimeFigureOut">
               <a:rPr lang="en-US" smtClean="0"/>
-              <a:t>6/25/2023</a:t>
+              <a:t>6/26/2023</a:t>
             </a:fld>
             <a:endParaRPr lang="en-US"/>
           </a:p>
@@ -1971,7 +1971,7 @@
           <a:p>
             <a:fld id="{6E4A31BF-7266-4BEB-918B-ADC21C630A6F}" type="datetimeFigureOut">
               <a:rPr lang="en-US" smtClean="0"/>
-              <a:t>6/25/2023</a:t>
+              <a:t>6/26/2023</a:t>
             </a:fld>
             <a:endParaRPr lang="en-US"/>
           </a:p>
@@ -2383,7 +2383,7 @@
           <a:p>
             <a:fld id="{6E4A31BF-7266-4BEB-918B-ADC21C630A6F}" type="datetimeFigureOut">
               <a:rPr lang="en-US" smtClean="0"/>
-              <a:t>6/25/2023</a:t>
+              <a:t>6/26/2023</a:t>
             </a:fld>
             <a:endParaRPr lang="en-US"/>
           </a:p>
@@ -2524,7 +2524,7 @@
           <a:p>
             <a:fld id="{6E4A31BF-7266-4BEB-918B-ADC21C630A6F}" type="datetimeFigureOut">
               <a:rPr lang="en-US" smtClean="0"/>
-              <a:t>6/25/2023</a:t>
+              <a:t>6/26/2023</a:t>
             </a:fld>
             <a:endParaRPr lang="en-US"/>
           </a:p>
@@ -2637,7 +2637,7 @@
           <a:p>
             <a:fld id="{6E4A31BF-7266-4BEB-918B-ADC21C630A6F}" type="datetimeFigureOut">
               <a:rPr lang="en-US" smtClean="0"/>
-              <a:t>6/25/2023</a:t>
+              <a:t>6/26/2023</a:t>
             </a:fld>
             <a:endParaRPr lang="en-US"/>
           </a:p>
@@ -2948,7 +2948,7 @@
           <a:p>
             <a:fld id="{6E4A31BF-7266-4BEB-918B-ADC21C630A6F}" type="datetimeFigureOut">
               <a:rPr lang="en-US" smtClean="0"/>
-              <a:t>6/25/2023</a:t>
+              <a:t>6/26/2023</a:t>
             </a:fld>
             <a:endParaRPr lang="en-US"/>
           </a:p>
@@ -3236,7 +3236,7 @@
           <a:p>
             <a:fld id="{6E4A31BF-7266-4BEB-918B-ADC21C630A6F}" type="datetimeFigureOut">
               <a:rPr lang="en-US" smtClean="0"/>
-              <a:t>6/25/2023</a:t>
+              <a:t>6/26/2023</a:t>
             </a:fld>
             <a:endParaRPr lang="en-US"/>
           </a:p>
@@ -3477,7 +3477,7 @@
           <a:p>
             <a:fld id="{6E4A31BF-7266-4BEB-918B-ADC21C630A6F}" type="datetimeFigureOut">
               <a:rPr lang="en-US" smtClean="0"/>
-              <a:t>6/25/2023</a:t>
+              <a:t>6/26/2023</a:t>
             </a:fld>
             <a:endParaRPr lang="en-US"/>
           </a:p>
@@ -13138,13 +13138,10 @@
                       <m:t>),  (</m:t>
                     </m:r>
                     <m:r>
-                      <m:rPr>
-                        <m:sty m:val="p"/>
-                      </m:rPr>
-                      <a:rPr lang="en-US" b="0" i="0" smtClean="0">
+                      <a:rPr lang="en-US" b="0" i="1" smtClean="0">
                         <a:latin typeface="Cambria Math" panose="02040503050406030204" pitchFamily="18" charset="0"/>
                       </a:rPr>
-                      <m:t>b</m:t>
+                      <m:t>𝑏</m:t>
                     </m:r>
                     <m:d>
                       <m:dPr>
@@ -13156,28 +13153,22 @@
                       </m:dPr>
                       <m:e>
                         <m:r>
-                          <m:rPr>
-                            <m:sty m:val="p"/>
-                          </m:rPr>
-                          <a:rPr lang="en-US" b="0" i="0" smtClean="0">
+                          <a:rPr lang="en-US" b="0" i="1" smtClean="0">
                             <a:latin typeface="Cambria Math" panose="02040503050406030204" pitchFamily="18" charset="0"/>
                           </a:rPr>
-                          <m:t>S</m:t>
+                          <m:t>𝑆</m:t>
                         </m:r>
                         <m:r>
-                          <a:rPr lang="en-US" b="0" i="0" smtClean="0">
+                          <a:rPr lang="en-US" b="0" i="1" smtClean="0">
                             <a:latin typeface="Cambria Math" panose="02040503050406030204" pitchFamily="18" charset="0"/>
                           </a:rPr>
                           <m:t>,</m:t>
                         </m:r>
                         <m:r>
-                          <m:rPr>
-                            <m:sty m:val="p"/>
-                          </m:rPr>
-                          <a:rPr lang="en-US" b="0" i="0" smtClean="0">
+                          <a:rPr lang="en-US" b="0" i="1" smtClean="0">
                             <a:latin typeface="Cambria Math" panose="02040503050406030204" pitchFamily="18" charset="0"/>
                           </a:rPr>
-                          <m:t>c</m:t>
+                          <m:t>𝑐</m:t>
                         </m:r>
                       </m:e>
                     </m:d>
@@ -23815,8 +23806,8 @@
           <a:chExt cx="0" cy="0"/>
         </a:xfrm>
       </p:grpSpPr>
-      <mc:AlternateContent xmlns:mc="http://schemas.openxmlformats.org/markup-compatibility/2006">
-        <mc:Choice xmlns:a14="http://schemas.microsoft.com/office/drawing/2010/main" Requires="a14">
+      <mc:AlternateContent xmlns:mc="http://schemas.openxmlformats.org/markup-compatibility/2006" xmlns:a14="http://schemas.microsoft.com/office/drawing/2010/main">
+        <mc:Choice Requires="a14">
           <p:sp>
             <p:nvSpPr>
               <p:cNvPr id="3" name="Content Placeholder 2">
@@ -24437,7 +24428,7 @@
             </p:txBody>
           </p:sp>
         </mc:Choice>
-        <mc:Fallback>
+        <mc:Fallback xmlns="">
           <p:sp>
             <p:nvSpPr>
               <p:cNvPr id="3" name="Content Placeholder 2">
@@ -24567,8 +24558,8 @@
           <a:chExt cx="0" cy="0"/>
         </a:xfrm>
       </p:grpSpPr>
-      <mc:AlternateContent xmlns:mc="http://schemas.openxmlformats.org/markup-compatibility/2006">
-        <mc:Choice xmlns:a14="http://schemas.microsoft.com/office/drawing/2010/main" Requires="a14">
+      <mc:AlternateContent xmlns:mc="http://schemas.openxmlformats.org/markup-compatibility/2006" xmlns:a14="http://schemas.microsoft.com/office/drawing/2010/main">
+        <mc:Choice Requires="a14">
           <p:sp>
             <p:nvSpPr>
               <p:cNvPr id="3" name="Content Placeholder 2">
@@ -25343,7 +25334,7 @@
             </p:txBody>
           </p:sp>
         </mc:Choice>
-        <mc:Fallback>
+        <mc:Fallback xmlns="">
           <p:sp>
             <p:nvSpPr>
               <p:cNvPr id="3" name="Content Placeholder 2">

</xml_diff>

<commit_message>
Small corrections and notation improvements in slides
</commit_message>
<xml_diff>
--- a/slides/2_BigDataComputing.pptx
+++ b/slides/2_BigDataComputing.pptx
@@ -242,7 +242,7 @@
           <a:p>
             <a:fld id="{2F3ABF1A-8818-4472-8518-E71DC7B5D2F7}" type="datetimeFigureOut">
               <a:rPr lang="en-US" smtClean="0"/>
-              <a:t>6/26/2023</a:t>
+              <a:t>1/27/2024</a:t>
             </a:fld>
             <a:endParaRPr lang="en-US"/>
           </a:p>
@@ -827,7 +827,7 @@
           <a:p>
             <a:fld id="{6E4A31BF-7266-4BEB-918B-ADC21C630A6F}" type="datetimeFigureOut">
               <a:rPr lang="en-US" smtClean="0"/>
-              <a:t>6/26/2023</a:t>
+              <a:t>1/27/2024</a:t>
             </a:fld>
             <a:endParaRPr lang="en-US"/>
           </a:p>
@@ -1025,7 +1025,7 @@
           <a:p>
             <a:fld id="{6E4A31BF-7266-4BEB-918B-ADC21C630A6F}" type="datetimeFigureOut">
               <a:rPr lang="en-US" smtClean="0"/>
-              <a:t>6/26/2023</a:t>
+              <a:t>1/27/2024</a:t>
             </a:fld>
             <a:endParaRPr lang="en-US"/>
           </a:p>
@@ -1233,7 +1233,7 @@
           <a:p>
             <a:fld id="{6E4A31BF-7266-4BEB-918B-ADC21C630A6F}" type="datetimeFigureOut">
               <a:rPr lang="en-US" smtClean="0"/>
-              <a:t>6/26/2023</a:t>
+              <a:t>1/27/2024</a:t>
             </a:fld>
             <a:endParaRPr lang="en-US"/>
           </a:p>
@@ -1431,7 +1431,7 @@
           <a:p>
             <a:fld id="{6E4A31BF-7266-4BEB-918B-ADC21C630A6F}" type="datetimeFigureOut">
               <a:rPr lang="en-US" smtClean="0"/>
-              <a:t>6/26/2023</a:t>
+              <a:t>1/27/2024</a:t>
             </a:fld>
             <a:endParaRPr lang="en-US"/>
           </a:p>
@@ -1706,7 +1706,7 @@
           <a:p>
             <a:fld id="{6E4A31BF-7266-4BEB-918B-ADC21C630A6F}" type="datetimeFigureOut">
               <a:rPr lang="en-US" smtClean="0"/>
-              <a:t>6/26/2023</a:t>
+              <a:t>1/27/2024</a:t>
             </a:fld>
             <a:endParaRPr lang="en-US"/>
           </a:p>
@@ -1971,7 +1971,7 @@
           <a:p>
             <a:fld id="{6E4A31BF-7266-4BEB-918B-ADC21C630A6F}" type="datetimeFigureOut">
               <a:rPr lang="en-US" smtClean="0"/>
-              <a:t>6/26/2023</a:t>
+              <a:t>1/27/2024</a:t>
             </a:fld>
             <a:endParaRPr lang="en-US"/>
           </a:p>
@@ -2383,7 +2383,7 @@
           <a:p>
             <a:fld id="{6E4A31BF-7266-4BEB-918B-ADC21C630A6F}" type="datetimeFigureOut">
               <a:rPr lang="en-US" smtClean="0"/>
-              <a:t>6/26/2023</a:t>
+              <a:t>1/27/2024</a:t>
             </a:fld>
             <a:endParaRPr lang="en-US"/>
           </a:p>
@@ -2524,7 +2524,7 @@
           <a:p>
             <a:fld id="{6E4A31BF-7266-4BEB-918B-ADC21C630A6F}" type="datetimeFigureOut">
               <a:rPr lang="en-US" smtClean="0"/>
-              <a:t>6/26/2023</a:t>
+              <a:t>1/27/2024</a:t>
             </a:fld>
             <a:endParaRPr lang="en-US"/>
           </a:p>
@@ -2637,7 +2637,7 @@
           <a:p>
             <a:fld id="{6E4A31BF-7266-4BEB-918B-ADC21C630A6F}" type="datetimeFigureOut">
               <a:rPr lang="en-US" smtClean="0"/>
-              <a:t>6/26/2023</a:t>
+              <a:t>1/27/2024</a:t>
             </a:fld>
             <a:endParaRPr lang="en-US"/>
           </a:p>
@@ -2948,7 +2948,7 @@
           <a:p>
             <a:fld id="{6E4A31BF-7266-4BEB-918B-ADC21C630A6F}" type="datetimeFigureOut">
               <a:rPr lang="en-US" smtClean="0"/>
-              <a:t>6/26/2023</a:t>
+              <a:t>1/27/2024</a:t>
             </a:fld>
             <a:endParaRPr lang="en-US"/>
           </a:p>
@@ -3236,7 +3236,7 @@
           <a:p>
             <a:fld id="{6E4A31BF-7266-4BEB-918B-ADC21C630A6F}" type="datetimeFigureOut">
               <a:rPr lang="en-US" smtClean="0"/>
-              <a:t>6/26/2023</a:t>
+              <a:t>1/27/2024</a:t>
             </a:fld>
             <a:endParaRPr lang="en-US"/>
           </a:p>
@@ -3477,7 +3477,7 @@
           <a:p>
             <a:fld id="{6E4A31BF-7266-4BEB-918B-ADC21C630A6F}" type="datetimeFigureOut">
               <a:rPr lang="en-US" smtClean="0"/>
-              <a:t>6/26/2023</a:t>
+              <a:t>1/27/2024</a:t>
             </a:fld>
             <a:endParaRPr lang="en-US"/>
           </a:p>
@@ -4067,7 +4067,7 @@
             <a:pPr algn="ctr"/>
             <a:r>
               <a:rPr lang="en-US" sz="1100" dirty="0"/>
-              <a:t>Copyright 2021, 2022, 2023, Stephen F Elston. All rights reserved</a:t>
+              <a:t>Copyright 2021, 2022, 2023, 2004, Stephen F Elston. All rights reserved</a:t>
             </a:r>
             <a:r>
               <a:rPr lang="en-US" dirty="0"/>
@@ -4178,7 +4178,7 @@
             <a:pPr lvl="1"/>
             <a:r>
               <a:rPr lang="en-US" dirty="0"/>
-              <a:t>2020 – 1,000 </a:t>
+              <a:t>2010 – 1,000 </a:t>
             </a:r>
             <a:r>
               <a:rPr lang="en-US" dirty="0" err="1"/>
@@ -4187,6 +4187,21 @@
             <a:r>
               <a:rPr lang="en-US" dirty="0"/>
               <a:t>/sec  </a:t>
+            </a:r>
+          </a:p>
+          <a:p>
+            <a:pPr lvl="1"/>
+            <a:r>
+              <a:rPr lang="en-US" dirty="0"/>
+              <a:t>2023 – 100,000 </a:t>
+            </a:r>
+            <a:r>
+              <a:rPr lang="en-US" dirty="0" err="1"/>
+              <a:t>Mbits</a:t>
+            </a:r>
+            <a:r>
+              <a:rPr lang="en-US" dirty="0"/>
+              <a:t>/sec </a:t>
             </a:r>
           </a:p>
           <a:p>
@@ -4512,33 +4527,15 @@
                                   </p:childTnLst>
                                 </p:cTn>
                               </p:par>
-                            </p:childTnLst>
-                          </p:cTn>
-                        </p:par>
-                      </p:childTnLst>
-                    </p:cTn>
-                  </p:par>
-                  <p:par>
-                    <p:cTn id="21" fill="hold">
-                      <p:stCondLst>
-                        <p:cond delay="indefinite"/>
-                      </p:stCondLst>
-                      <p:childTnLst>
-                        <p:par>
-                          <p:cTn id="22" fill="hold">
-                            <p:stCondLst>
-                              <p:cond delay="0"/>
-                            </p:stCondLst>
-                            <p:childTnLst>
                               <p:par>
-                                <p:cTn id="23" presetID="1" presetClass="entr" presetSubtype="0" fill="hold" nodeType="clickEffect">
+                                <p:cTn id="21" presetID="1" presetClass="entr" presetSubtype="0" fill="hold" nodeType="withEffect">
                                   <p:stCondLst>
                                     <p:cond delay="0"/>
                                   </p:stCondLst>
                                   <p:childTnLst>
                                     <p:set>
                                       <p:cBhvr>
-                                        <p:cTn id="24" dur="1" fill="hold">
+                                        <p:cTn id="22" dur="1" fill="hold">
                                           <p:stCondLst>
                                             <p:cond delay="0"/>
                                           </p:stCondLst>
@@ -4547,6 +4544,55 @@
                                           <p:spTgt spid="3">
                                             <p:txEl>
                                               <p:pRg st="7" end="7"/>
+                                            </p:txEl>
+                                          </p:spTgt>
+                                        </p:tgtEl>
+                                        <p:attrNameLst>
+                                          <p:attrName>style.visibility</p:attrName>
+                                        </p:attrNameLst>
+                                      </p:cBhvr>
+                                      <p:to>
+                                        <p:strVal val="visible"/>
+                                      </p:to>
+                                    </p:set>
+                                  </p:childTnLst>
+                                </p:cTn>
+                              </p:par>
+                            </p:childTnLst>
+                          </p:cTn>
+                        </p:par>
+                      </p:childTnLst>
+                    </p:cTn>
+                  </p:par>
+                  <p:par>
+                    <p:cTn id="23" fill="hold">
+                      <p:stCondLst>
+                        <p:cond delay="indefinite"/>
+                      </p:stCondLst>
+                      <p:childTnLst>
+                        <p:par>
+                          <p:cTn id="24" fill="hold">
+                            <p:stCondLst>
+                              <p:cond delay="0"/>
+                            </p:stCondLst>
+                            <p:childTnLst>
+                              <p:par>
+                                <p:cTn id="25" presetID="1" presetClass="entr" presetSubtype="0" fill="hold" nodeType="clickEffect">
+                                  <p:stCondLst>
+                                    <p:cond delay="0"/>
+                                  </p:stCondLst>
+                                  <p:childTnLst>
+                                    <p:set>
+                                      <p:cBhvr>
+                                        <p:cTn id="26" dur="1" fill="hold">
+                                          <p:stCondLst>
+                                            <p:cond delay="0"/>
+                                          </p:stCondLst>
+                                        </p:cTn>
+                                        <p:tgtEl>
+                                          <p:spTgt spid="3">
+                                            <p:txEl>
+                                              <p:pRg st="8" end="8"/>
                                             </p:txEl>
                                           </p:spTgt>
                                         </p:tgtEl>
@@ -7091,8 +7137,8 @@
         </p:nvSpPr>
         <p:spPr bwMode="auto">
           <a:xfrm>
-            <a:off x="1908632" y="3429000"/>
-            <a:ext cx="3330543" cy="447285"/>
+            <a:off x="1668026" y="3429000"/>
+            <a:ext cx="3571149" cy="447285"/>
           </a:xfrm>
           <a:prstGeom prst="rect">
             <a:avLst/>
@@ -7115,7 +7161,7 @@
             <a:pPr algn="ctr"/>
             <a:r>
               <a:rPr lang="en-US" sz="2400" dirty="0"/>
-              <a:t>Switch: 1 Gbps within rack</a:t>
+              <a:t>Switch: 10 Gbps within rack</a:t>
             </a:r>
           </a:p>
         </p:txBody>
@@ -7770,7 +7816,7 @@
             <a:pPr algn="ctr"/>
             <a:r>
               <a:rPr lang="en-US" sz="2400" dirty="0"/>
-              <a:t>Switch: 2-10 Gbps, rack interconnect backbone </a:t>
+              <a:t>Switch: 2-100 Gbps, rack interconnect backbone </a:t>
             </a:r>
           </a:p>
         </p:txBody>
@@ -7874,7 +7920,7 @@
         <p:spPr bwMode="auto">
           <a:xfrm>
             <a:off x="5829194" y="3410731"/>
-            <a:ext cx="3330543" cy="487979"/>
+            <a:ext cx="3666498" cy="487979"/>
           </a:xfrm>
           <a:prstGeom prst="rect">
             <a:avLst/>
@@ -7897,7 +7943,7 @@
             <a:pPr algn="ctr"/>
             <a:r>
               <a:rPr lang="en-US" sz="2400" dirty="0"/>
-              <a:t>Switch: 1 Gbps within rack</a:t>
+              <a:t>Switch: 10 Gbps within rack</a:t>
             </a:r>
           </a:p>
         </p:txBody>
@@ -12950,8 +12996,8 @@
           <a:chExt cx="0" cy="0"/>
         </a:xfrm>
       </p:grpSpPr>
-      <mc:AlternateContent xmlns:mc="http://schemas.openxmlformats.org/markup-compatibility/2006">
-        <mc:Choice xmlns:a14="http://schemas.microsoft.com/office/drawing/2010/main" Requires="a14">
+      <mc:AlternateContent xmlns:mc="http://schemas.openxmlformats.org/markup-compatibility/2006" xmlns:a14="http://schemas.microsoft.com/office/drawing/2010/main">
+        <mc:Choice Requires="a14">
           <p:sp>
             <p:nvSpPr>
               <p:cNvPr id="3" name="Content Placeholder 2">
@@ -13529,7 +13575,7 @@
             </p:txBody>
           </p:sp>
         </mc:Choice>
-        <mc:Fallback>
+        <mc:Fallback xmlns="">
           <p:sp>
             <p:nvSpPr>
               <p:cNvPr id="3" name="Content Placeholder 2">
@@ -19735,7 +19781,7 @@
               <a:p>
                 <a:r>
                   <a:rPr lang="en-US" dirty="0"/>
-                  <a:t>The scaling of the naïve similarity join is terrible    </a:t>
+                  <a:t>The scaling of the naïve similarity join is terrible!    </a:t>
                 </a:r>
               </a:p>
               <a:p>
@@ -26530,8 +26576,8 @@
           <a:chExt cx="0" cy="0"/>
         </a:xfrm>
       </p:grpSpPr>
-      <mc:AlternateContent xmlns:mc="http://schemas.openxmlformats.org/markup-compatibility/2006" xmlns:a14="http://schemas.microsoft.com/office/drawing/2010/main">
-        <mc:Choice Requires="a14">
+      <mc:AlternateContent xmlns:mc="http://schemas.openxmlformats.org/markup-compatibility/2006">
+        <mc:Choice xmlns:a14="http://schemas.microsoft.com/office/drawing/2010/main" Requires="a14">
           <p:sp>
             <p:nvSpPr>
               <p:cNvPr id="3" name="Content Placeholder 2">
@@ -26657,6 +26703,18 @@
                           <a:rPr lang="en-US" sz="3300" b="0" i="1" dirty="0" smtClean="0">
                             <a:latin typeface="Cambria Math" panose="02040503050406030204" pitchFamily="18" charset="0"/>
                           </a:rPr>
+                          <m:t>𝑖𝑑</m:t>
+                        </m:r>
+                        <m:r>
+                          <a:rPr lang="en-US" sz="3300" b="0" i="1" dirty="0" smtClean="0">
+                            <a:latin typeface="Cambria Math" panose="02040503050406030204" pitchFamily="18" charset="0"/>
+                          </a:rPr>
+                          <m:t>,</m:t>
+                        </m:r>
+                        <m:r>
+                          <a:rPr lang="en-US" sz="3300" b="0" i="1" dirty="0" smtClean="0">
+                            <a:latin typeface="Cambria Math" panose="02040503050406030204" pitchFamily="18" charset="0"/>
+                          </a:rPr>
                           <m:t>𝑖</m:t>
                         </m:r>
                         <m:r>
@@ -26720,6 +26778,13 @@
                 <a:r>
                   <a:rPr lang="en-US" dirty="0"/>
                   <a:t> </a:t>
+                </a:r>
+              </a:p>
+              <a:p>
+                <a:pPr lvl="1"/>
+                <a:r>
+                  <a:rPr lang="en-US" sz="2800" dirty="0"/>
+                  <a:t>id = array index</a:t>
                 </a:r>
               </a:p>
               <a:p>
@@ -26876,7 +26941,7 @@
             </p:txBody>
           </p:sp>
         </mc:Choice>
-        <mc:Fallback xmlns="">
+        <mc:Fallback>
           <p:sp>
             <p:nvSpPr>
               <p:cNvPr id="3" name="Content Placeholder 2">
@@ -26901,7 +26966,7 @@
               <a:blipFill>
                 <a:blip r:embed="rId2"/>
                 <a:stretch>
-                  <a:fillRect l="-1507" t="-2580"/>
+                  <a:fillRect l="-1507" t="-2580" b="-3317"/>
                 </a:stretch>
               </a:blipFill>
             </p:spPr>
@@ -26986,330 +27051,6 @@
   <p:clrMapOvr>
     <a:masterClrMapping/>
   </p:clrMapOvr>
-  <p:timing>
-    <p:tnLst>
-      <p:par>
-        <p:cTn id="1" dur="indefinite" restart="never" nodeType="tmRoot">
-          <p:childTnLst>
-            <p:seq concurrent="1" nextAc="seek">
-              <p:cTn id="2" dur="indefinite" nodeType="mainSeq">
-                <p:childTnLst>
-                  <p:par>
-                    <p:cTn id="3" fill="hold">
-                      <p:stCondLst>
-                        <p:cond delay="indefinite"/>
-                      </p:stCondLst>
-                      <p:childTnLst>
-                        <p:par>
-                          <p:cTn id="4" fill="hold">
-                            <p:stCondLst>
-                              <p:cond delay="0"/>
-                            </p:stCondLst>
-                            <p:childTnLst>
-                              <p:par>
-                                <p:cTn id="5" presetID="1" presetClass="entr" presetSubtype="0" fill="hold" nodeType="clickEffect">
-                                  <p:stCondLst>
-                                    <p:cond delay="0"/>
-                                  </p:stCondLst>
-                                  <p:childTnLst>
-                                    <p:set>
-                                      <p:cBhvr>
-                                        <p:cTn id="6" dur="1" fill="hold">
-                                          <p:stCondLst>
-                                            <p:cond delay="0"/>
-                                          </p:stCondLst>
-                                        </p:cTn>
-                                        <p:tgtEl>
-                                          <p:spTgt spid="3">
-                                            <p:txEl>
-                                              <p:pRg st="2" end="2"/>
-                                            </p:txEl>
-                                          </p:spTgt>
-                                        </p:tgtEl>
-                                        <p:attrNameLst>
-                                          <p:attrName>style.visibility</p:attrName>
-                                        </p:attrNameLst>
-                                      </p:cBhvr>
-                                      <p:to>
-                                        <p:strVal val="visible"/>
-                                      </p:to>
-                                    </p:set>
-                                  </p:childTnLst>
-                                </p:cTn>
-                              </p:par>
-                            </p:childTnLst>
-                          </p:cTn>
-                        </p:par>
-                      </p:childTnLst>
-                    </p:cTn>
-                  </p:par>
-                  <p:par>
-                    <p:cTn id="7" fill="hold">
-                      <p:stCondLst>
-                        <p:cond delay="indefinite"/>
-                      </p:stCondLst>
-                      <p:childTnLst>
-                        <p:par>
-                          <p:cTn id="8" fill="hold">
-                            <p:stCondLst>
-                              <p:cond delay="0"/>
-                            </p:stCondLst>
-                            <p:childTnLst>
-                              <p:par>
-                                <p:cTn id="9" presetID="1" presetClass="entr" presetSubtype="0" fill="hold" nodeType="clickEffect">
-                                  <p:stCondLst>
-                                    <p:cond delay="0"/>
-                                  </p:stCondLst>
-                                  <p:childTnLst>
-                                    <p:set>
-                                      <p:cBhvr>
-                                        <p:cTn id="10" dur="1" fill="hold">
-                                          <p:stCondLst>
-                                            <p:cond delay="0"/>
-                                          </p:stCondLst>
-                                        </p:cTn>
-                                        <p:tgtEl>
-                                          <p:spTgt spid="3">
-                                            <p:txEl>
-                                              <p:pRg st="3" end="3"/>
-                                            </p:txEl>
-                                          </p:spTgt>
-                                        </p:tgtEl>
-                                        <p:attrNameLst>
-                                          <p:attrName>style.visibility</p:attrName>
-                                        </p:attrNameLst>
-                                      </p:cBhvr>
-                                      <p:to>
-                                        <p:strVal val="visible"/>
-                                      </p:to>
-                                    </p:set>
-                                  </p:childTnLst>
-                                </p:cTn>
-                              </p:par>
-                            </p:childTnLst>
-                          </p:cTn>
-                        </p:par>
-                      </p:childTnLst>
-                    </p:cTn>
-                  </p:par>
-                  <p:par>
-                    <p:cTn id="11" fill="hold">
-                      <p:stCondLst>
-                        <p:cond delay="indefinite"/>
-                      </p:stCondLst>
-                      <p:childTnLst>
-                        <p:par>
-                          <p:cTn id="12" fill="hold">
-                            <p:stCondLst>
-                              <p:cond delay="0"/>
-                            </p:stCondLst>
-                            <p:childTnLst>
-                              <p:par>
-                                <p:cTn id="13" presetID="1" presetClass="entr" presetSubtype="0" fill="hold" nodeType="clickEffect">
-                                  <p:stCondLst>
-                                    <p:cond delay="0"/>
-                                  </p:stCondLst>
-                                  <p:childTnLst>
-                                    <p:set>
-                                      <p:cBhvr>
-                                        <p:cTn id="14" dur="1" fill="hold">
-                                          <p:stCondLst>
-                                            <p:cond delay="0"/>
-                                          </p:stCondLst>
-                                        </p:cTn>
-                                        <p:tgtEl>
-                                          <p:spTgt spid="3">
-                                            <p:txEl>
-                                              <p:pRg st="4" end="4"/>
-                                            </p:txEl>
-                                          </p:spTgt>
-                                        </p:tgtEl>
-                                        <p:attrNameLst>
-                                          <p:attrName>style.visibility</p:attrName>
-                                        </p:attrNameLst>
-                                      </p:cBhvr>
-                                      <p:to>
-                                        <p:strVal val="visible"/>
-                                      </p:to>
-                                    </p:set>
-                                  </p:childTnLst>
-                                </p:cTn>
-                              </p:par>
-                            </p:childTnLst>
-                          </p:cTn>
-                        </p:par>
-                      </p:childTnLst>
-                    </p:cTn>
-                  </p:par>
-                  <p:par>
-                    <p:cTn id="15" fill="hold">
-                      <p:stCondLst>
-                        <p:cond delay="indefinite"/>
-                      </p:stCondLst>
-                      <p:childTnLst>
-                        <p:par>
-                          <p:cTn id="16" fill="hold">
-                            <p:stCondLst>
-                              <p:cond delay="0"/>
-                            </p:stCondLst>
-                            <p:childTnLst>
-                              <p:par>
-                                <p:cTn id="17" presetID="1" presetClass="entr" presetSubtype="0" fill="hold" nodeType="clickEffect">
-                                  <p:stCondLst>
-                                    <p:cond delay="0"/>
-                                  </p:stCondLst>
-                                  <p:childTnLst>
-                                    <p:set>
-                                      <p:cBhvr>
-                                        <p:cTn id="18" dur="1" fill="hold">
-                                          <p:stCondLst>
-                                            <p:cond delay="0"/>
-                                          </p:stCondLst>
-                                        </p:cTn>
-                                        <p:tgtEl>
-                                          <p:spTgt spid="3">
-                                            <p:txEl>
-                                              <p:pRg st="5" end="5"/>
-                                            </p:txEl>
-                                          </p:spTgt>
-                                        </p:tgtEl>
-                                        <p:attrNameLst>
-                                          <p:attrName>style.visibility</p:attrName>
-                                        </p:attrNameLst>
-                                      </p:cBhvr>
-                                      <p:to>
-                                        <p:strVal val="visible"/>
-                                      </p:to>
-                                    </p:set>
-                                  </p:childTnLst>
-                                </p:cTn>
-                              </p:par>
-                            </p:childTnLst>
-                          </p:cTn>
-                        </p:par>
-                      </p:childTnLst>
-                    </p:cTn>
-                  </p:par>
-                  <p:par>
-                    <p:cTn id="19" fill="hold">
-                      <p:stCondLst>
-                        <p:cond delay="indefinite"/>
-                      </p:stCondLst>
-                      <p:childTnLst>
-                        <p:par>
-                          <p:cTn id="20" fill="hold">
-                            <p:stCondLst>
-                              <p:cond delay="0"/>
-                            </p:stCondLst>
-                            <p:childTnLst>
-                              <p:par>
-                                <p:cTn id="21" presetID="1" presetClass="entr" presetSubtype="0" fill="hold" nodeType="clickEffect">
-                                  <p:stCondLst>
-                                    <p:cond delay="0"/>
-                                  </p:stCondLst>
-                                  <p:childTnLst>
-                                    <p:set>
-                                      <p:cBhvr>
-                                        <p:cTn id="22" dur="1" fill="hold">
-                                          <p:stCondLst>
-                                            <p:cond delay="0"/>
-                                          </p:stCondLst>
-                                        </p:cTn>
-                                        <p:tgtEl>
-                                          <p:spTgt spid="3">
-                                            <p:txEl>
-                                              <p:pRg st="6" end="6"/>
-                                            </p:txEl>
-                                          </p:spTgt>
-                                        </p:tgtEl>
-                                        <p:attrNameLst>
-                                          <p:attrName>style.visibility</p:attrName>
-                                        </p:attrNameLst>
-                                      </p:cBhvr>
-                                      <p:to>
-                                        <p:strVal val="visible"/>
-                                      </p:to>
-                                    </p:set>
-                                  </p:childTnLst>
-                                </p:cTn>
-                              </p:par>
-                            </p:childTnLst>
-                          </p:cTn>
-                        </p:par>
-                      </p:childTnLst>
-                    </p:cTn>
-                  </p:par>
-                  <p:par>
-                    <p:cTn id="23" fill="hold">
-                      <p:stCondLst>
-                        <p:cond delay="indefinite"/>
-                      </p:stCondLst>
-                      <p:childTnLst>
-                        <p:par>
-                          <p:cTn id="24" fill="hold">
-                            <p:stCondLst>
-                              <p:cond delay="0"/>
-                            </p:stCondLst>
-                            <p:childTnLst>
-                              <p:par>
-                                <p:cTn id="25" presetID="1" presetClass="entr" presetSubtype="0" fill="hold" nodeType="clickEffect">
-                                  <p:stCondLst>
-                                    <p:cond delay="0"/>
-                                  </p:stCondLst>
-                                  <p:childTnLst>
-                                    <p:set>
-                                      <p:cBhvr>
-                                        <p:cTn id="26" dur="1" fill="hold">
-                                          <p:stCondLst>
-                                            <p:cond delay="0"/>
-                                          </p:stCondLst>
-                                        </p:cTn>
-                                        <p:tgtEl>
-                                          <p:spTgt spid="3">
-                                            <p:txEl>
-                                              <p:pRg st="7" end="7"/>
-                                            </p:txEl>
-                                          </p:spTgt>
-                                        </p:tgtEl>
-                                        <p:attrNameLst>
-                                          <p:attrName>style.visibility</p:attrName>
-                                        </p:attrNameLst>
-                                      </p:cBhvr>
-                                      <p:to>
-                                        <p:strVal val="visible"/>
-                                      </p:to>
-                                    </p:set>
-                                  </p:childTnLst>
-                                </p:cTn>
-                              </p:par>
-                            </p:childTnLst>
-                          </p:cTn>
-                        </p:par>
-                      </p:childTnLst>
-                    </p:cTn>
-                  </p:par>
-                </p:childTnLst>
-              </p:cTn>
-              <p:prevCondLst>
-                <p:cond evt="onPrev" delay="0">
-                  <p:tgtEl>
-                    <p:sldTgt/>
-                  </p:tgtEl>
-                </p:cond>
-              </p:prevCondLst>
-              <p:nextCondLst>
-                <p:cond evt="onNext" delay="0">
-                  <p:tgtEl>
-                    <p:sldTgt/>
-                  </p:tgtEl>
-                </p:cond>
-              </p:nextCondLst>
-            </p:seq>
-          </p:childTnLst>
-        </p:cTn>
-      </p:par>
-    </p:tnLst>
-  </p:timing>
 </p:sld>
 </file>
 
@@ -28102,8 +27843,8 @@
           <a:chExt cx="0" cy="0"/>
         </a:xfrm>
       </p:grpSpPr>
-      <mc:AlternateContent xmlns:mc="http://schemas.openxmlformats.org/markup-compatibility/2006" xmlns:a14="http://schemas.microsoft.com/office/drawing/2010/main">
-        <mc:Choice Requires="a14">
+      <mc:AlternateContent xmlns:mc="http://schemas.openxmlformats.org/markup-compatibility/2006">
+        <mc:Choice xmlns:a14="http://schemas.microsoft.com/office/drawing/2010/main" Requires="a14">
           <p:sp>
             <p:nvSpPr>
               <p:cNvPr id="3" name="Content Placeholder 2">
@@ -28380,6 +28121,13 @@
                             </a:rPr>
                             <m:t>,</m:t>
                           </m:r>
+                          <m:r>
+                            <a:rPr lang="en-US" b="0" i="1" smtClean="0">
+                              <a:latin typeface="Cambria Math" panose="02040503050406030204" pitchFamily="18" charset="0"/>
+                              <a:ea typeface="Cambria Math" panose="02040503050406030204" pitchFamily="18" charset="0"/>
+                            </a:rPr>
+                            <m:t>  </m:t>
+                          </m:r>
                           <m:sSub>
                             <m:sSubPr>
                               <m:ctrlPr>
@@ -28551,7 +28299,11 @@
                 </a:r>
                 <a:r>
                   <a:rPr lang="en-US" sz="2800" dirty="0" err="1"/>
-                  <a:t>ith</a:t>
+                  <a:t>i</a:t>
+                </a:r>
+                <a:r>
+                  <a:rPr lang="en-US" sz="2800" baseline="30000" dirty="0" err="1"/>
+                  <a:t>th</a:t>
                 </a:r>
                 <a:r>
                   <a:rPr lang="en-US" sz="2800" dirty="0"/>
@@ -28617,7 +28369,11 @@
                 </a:r>
                 <a:r>
                   <a:rPr lang="en-US" sz="2800" dirty="0" err="1"/>
-                  <a:t>jth</a:t>
+                  <a:t>j</a:t>
+                </a:r>
+                <a:r>
+                  <a:rPr lang="en-US" sz="2800" baseline="30000" dirty="0" err="1"/>
+                  <a:t>th</a:t>
                 </a:r>
                 <a:r>
                   <a:rPr lang="en-US" sz="2800" dirty="0"/>
@@ -28661,7 +28417,7 @@
             </p:txBody>
           </p:sp>
         </mc:Choice>
-        <mc:Fallback xmlns="">
+        <mc:Fallback>
           <p:sp>
             <p:nvSpPr>
               <p:cNvPr id="3" name="Content Placeholder 2">
@@ -32975,8 +32731,8 @@
           <a:chExt cx="0" cy="0"/>
         </a:xfrm>
       </p:grpSpPr>
-      <mc:AlternateContent xmlns:mc="http://schemas.openxmlformats.org/markup-compatibility/2006" xmlns:a14="http://schemas.microsoft.com/office/drawing/2010/main">
-        <mc:Choice Requires="a14">
+      <mc:AlternateContent xmlns:mc="http://schemas.openxmlformats.org/markup-compatibility/2006">
+        <mc:Choice xmlns:a14="http://schemas.microsoft.com/office/drawing/2010/main" Requires="a14">
           <p:sp>
             <p:nvSpPr>
               <p:cNvPr id="3" name="Content Placeholder 2">
@@ -33094,6 +32850,18 @@
                         <a:latin typeface="Cambria Math" panose="02040503050406030204" pitchFamily="18" charset="0"/>
                       </a:rPr>
                       <m:t>(</m:t>
+                    </m:r>
+                    <m:r>
+                      <a:rPr lang="en-US" b="0" i="1" smtClean="0">
+                        <a:latin typeface="Cambria Math" panose="02040503050406030204" pitchFamily="18" charset="0"/>
+                      </a:rPr>
+                      <m:t>𝑎</m:t>
+                    </m:r>
+                    <m:r>
+                      <a:rPr lang="en-US" b="0" i="1" smtClean="0">
+                        <a:latin typeface="Cambria Math" panose="02040503050406030204" pitchFamily="18" charset="0"/>
+                      </a:rPr>
+                      <m:t>,</m:t>
                     </m:r>
                     <m:r>
                       <a:rPr lang="en-US" b="0" i="1" smtClean="0">
@@ -33242,6 +33010,18 @@
                       <m:t>(</m:t>
                     </m:r>
                     <m:r>
+                      <a:rPr lang="en-US" b="0" i="1" smtClean="0">
+                        <a:latin typeface="Cambria Math" panose="02040503050406030204" pitchFamily="18" charset="0"/>
+                      </a:rPr>
+                      <m:t>𝑏</m:t>
+                    </m:r>
+                    <m:r>
+                      <a:rPr lang="en-US" b="0" i="1" smtClean="0">
+                        <a:latin typeface="Cambria Math" panose="02040503050406030204" pitchFamily="18" charset="0"/>
+                      </a:rPr>
+                      <m:t>,</m:t>
+                    </m:r>
+                    <m:r>
                       <a:rPr lang="en-US" i="1">
                         <a:latin typeface="Cambria Math" panose="02040503050406030204" pitchFamily="18" charset="0"/>
                       </a:rPr>
@@ -33359,7 +33139,7 @@
             </p:txBody>
           </p:sp>
         </mc:Choice>
-        <mc:Fallback xmlns="">
+        <mc:Fallback>
           <p:sp>
             <p:nvSpPr>
               <p:cNvPr id="3" name="Content Placeholder 2">
@@ -33469,294 +33249,6 @@
   <p:clrMapOvr>
     <a:masterClrMapping/>
   </p:clrMapOvr>
-  <p:timing>
-    <p:tnLst>
-      <p:par>
-        <p:cTn id="1" dur="indefinite" restart="never" nodeType="tmRoot">
-          <p:childTnLst>
-            <p:seq concurrent="1" nextAc="seek">
-              <p:cTn id="2" dur="indefinite" nodeType="mainSeq">
-                <p:childTnLst>
-                  <p:par>
-                    <p:cTn id="3" fill="hold">
-                      <p:stCondLst>
-                        <p:cond delay="indefinite"/>
-                      </p:stCondLst>
-                      <p:childTnLst>
-                        <p:par>
-                          <p:cTn id="4" fill="hold">
-                            <p:stCondLst>
-                              <p:cond delay="0"/>
-                            </p:stCondLst>
-                            <p:childTnLst>
-                              <p:par>
-                                <p:cTn id="5" presetID="1" presetClass="entr" presetSubtype="0" fill="hold" nodeType="clickEffect">
-                                  <p:stCondLst>
-                                    <p:cond delay="0"/>
-                                  </p:stCondLst>
-                                  <p:childTnLst>
-                                    <p:set>
-                                      <p:cBhvr>
-                                        <p:cTn id="6" dur="1" fill="hold">
-                                          <p:stCondLst>
-                                            <p:cond delay="0"/>
-                                          </p:stCondLst>
-                                        </p:cTn>
-                                        <p:tgtEl>
-                                          <p:spTgt spid="3">
-                                            <p:txEl>
-                                              <p:pRg st="1" end="1"/>
-                                            </p:txEl>
-                                          </p:spTgt>
-                                        </p:tgtEl>
-                                        <p:attrNameLst>
-                                          <p:attrName>style.visibility</p:attrName>
-                                        </p:attrNameLst>
-                                      </p:cBhvr>
-                                      <p:to>
-                                        <p:strVal val="visible"/>
-                                      </p:to>
-                                    </p:set>
-                                  </p:childTnLst>
-                                </p:cTn>
-                              </p:par>
-                            </p:childTnLst>
-                          </p:cTn>
-                        </p:par>
-                      </p:childTnLst>
-                    </p:cTn>
-                  </p:par>
-                  <p:par>
-                    <p:cTn id="7" fill="hold">
-                      <p:stCondLst>
-                        <p:cond delay="indefinite"/>
-                      </p:stCondLst>
-                      <p:childTnLst>
-                        <p:par>
-                          <p:cTn id="8" fill="hold">
-                            <p:stCondLst>
-                              <p:cond delay="0"/>
-                            </p:stCondLst>
-                            <p:childTnLst>
-                              <p:par>
-                                <p:cTn id="9" presetID="1" presetClass="entr" presetSubtype="0" fill="hold" nodeType="clickEffect">
-                                  <p:stCondLst>
-                                    <p:cond delay="0"/>
-                                  </p:stCondLst>
-                                  <p:childTnLst>
-                                    <p:set>
-                                      <p:cBhvr>
-                                        <p:cTn id="10" dur="1" fill="hold">
-                                          <p:stCondLst>
-                                            <p:cond delay="0"/>
-                                          </p:stCondLst>
-                                        </p:cTn>
-                                        <p:tgtEl>
-                                          <p:spTgt spid="3">
-                                            <p:txEl>
-                                              <p:pRg st="2" end="2"/>
-                                            </p:txEl>
-                                          </p:spTgt>
-                                        </p:tgtEl>
-                                        <p:attrNameLst>
-                                          <p:attrName>style.visibility</p:attrName>
-                                        </p:attrNameLst>
-                                      </p:cBhvr>
-                                      <p:to>
-                                        <p:strVal val="visible"/>
-                                      </p:to>
-                                    </p:set>
-                                  </p:childTnLst>
-                                </p:cTn>
-                              </p:par>
-                              <p:par>
-                                <p:cTn id="11" presetID="1" presetClass="entr" presetSubtype="0" fill="hold" nodeType="withEffect">
-                                  <p:stCondLst>
-                                    <p:cond delay="0"/>
-                                  </p:stCondLst>
-                                  <p:childTnLst>
-                                    <p:set>
-                                      <p:cBhvr>
-                                        <p:cTn id="12" dur="1" fill="hold">
-                                          <p:stCondLst>
-                                            <p:cond delay="0"/>
-                                          </p:stCondLst>
-                                        </p:cTn>
-                                        <p:tgtEl>
-                                          <p:spTgt spid="3">
-                                            <p:txEl>
-                                              <p:pRg st="3" end="3"/>
-                                            </p:txEl>
-                                          </p:spTgt>
-                                        </p:tgtEl>
-                                        <p:attrNameLst>
-                                          <p:attrName>style.visibility</p:attrName>
-                                        </p:attrNameLst>
-                                      </p:cBhvr>
-                                      <p:to>
-                                        <p:strVal val="visible"/>
-                                      </p:to>
-                                    </p:set>
-                                  </p:childTnLst>
-                                </p:cTn>
-                              </p:par>
-                            </p:childTnLst>
-                          </p:cTn>
-                        </p:par>
-                      </p:childTnLst>
-                    </p:cTn>
-                  </p:par>
-                  <p:par>
-                    <p:cTn id="13" fill="hold">
-                      <p:stCondLst>
-                        <p:cond delay="indefinite"/>
-                      </p:stCondLst>
-                      <p:childTnLst>
-                        <p:par>
-                          <p:cTn id="14" fill="hold">
-                            <p:stCondLst>
-                              <p:cond delay="0"/>
-                            </p:stCondLst>
-                            <p:childTnLst>
-                              <p:par>
-                                <p:cTn id="15" presetID="1" presetClass="entr" presetSubtype="0" fill="hold" nodeType="clickEffect">
-                                  <p:stCondLst>
-                                    <p:cond delay="0"/>
-                                  </p:stCondLst>
-                                  <p:childTnLst>
-                                    <p:set>
-                                      <p:cBhvr>
-                                        <p:cTn id="16" dur="1" fill="hold">
-                                          <p:stCondLst>
-                                            <p:cond delay="0"/>
-                                          </p:stCondLst>
-                                        </p:cTn>
-                                        <p:tgtEl>
-                                          <p:spTgt spid="3">
-                                            <p:txEl>
-                                              <p:pRg st="4" end="4"/>
-                                            </p:txEl>
-                                          </p:spTgt>
-                                        </p:tgtEl>
-                                        <p:attrNameLst>
-                                          <p:attrName>style.visibility</p:attrName>
-                                        </p:attrNameLst>
-                                      </p:cBhvr>
-                                      <p:to>
-                                        <p:strVal val="visible"/>
-                                      </p:to>
-                                    </p:set>
-                                  </p:childTnLst>
-                                </p:cTn>
-                              </p:par>
-                              <p:par>
-                                <p:cTn id="17" presetID="1" presetClass="entr" presetSubtype="0" fill="hold" nodeType="withEffect">
-                                  <p:stCondLst>
-                                    <p:cond delay="0"/>
-                                  </p:stCondLst>
-                                  <p:childTnLst>
-                                    <p:set>
-                                      <p:cBhvr>
-                                        <p:cTn id="18" dur="1" fill="hold">
-                                          <p:stCondLst>
-                                            <p:cond delay="0"/>
-                                          </p:stCondLst>
-                                        </p:cTn>
-                                        <p:tgtEl>
-                                          <p:spTgt spid="3">
-                                            <p:txEl>
-                                              <p:pRg st="5" end="5"/>
-                                            </p:txEl>
-                                          </p:spTgt>
-                                        </p:tgtEl>
-                                        <p:attrNameLst>
-                                          <p:attrName>style.visibility</p:attrName>
-                                        </p:attrNameLst>
-                                      </p:cBhvr>
-                                      <p:to>
-                                        <p:strVal val="visible"/>
-                                      </p:to>
-                                    </p:set>
-                                  </p:childTnLst>
-                                </p:cTn>
-                              </p:par>
-                            </p:childTnLst>
-                          </p:cTn>
-                        </p:par>
-                      </p:childTnLst>
-                    </p:cTn>
-                  </p:par>
-                  <p:par>
-                    <p:cTn id="19" fill="hold">
-                      <p:stCondLst>
-                        <p:cond delay="indefinite"/>
-                      </p:stCondLst>
-                      <p:childTnLst>
-                        <p:par>
-                          <p:cTn id="20" fill="hold">
-                            <p:stCondLst>
-                              <p:cond delay="0"/>
-                            </p:stCondLst>
-                            <p:childTnLst>
-                              <p:par>
-                                <p:cTn id="21" presetID="1" presetClass="entr" presetSubtype="0" fill="hold" nodeType="clickEffect">
-                                  <p:stCondLst>
-                                    <p:cond delay="0"/>
-                                  </p:stCondLst>
-                                  <p:childTnLst>
-                                    <p:set>
-                                      <p:cBhvr>
-                                        <p:cTn id="22" dur="1" fill="hold">
-                                          <p:stCondLst>
-                                            <p:cond delay="0"/>
-                                          </p:stCondLst>
-                                        </p:cTn>
-                                        <p:tgtEl>
-                                          <p:spTgt spid="3">
-                                            <p:txEl>
-                                              <p:pRg st="6" end="6"/>
-                                            </p:txEl>
-                                          </p:spTgt>
-                                        </p:tgtEl>
-                                        <p:attrNameLst>
-                                          <p:attrName>style.visibility</p:attrName>
-                                        </p:attrNameLst>
-                                      </p:cBhvr>
-                                      <p:to>
-                                        <p:strVal val="visible"/>
-                                      </p:to>
-                                    </p:set>
-                                  </p:childTnLst>
-                                </p:cTn>
-                              </p:par>
-                            </p:childTnLst>
-                          </p:cTn>
-                        </p:par>
-                      </p:childTnLst>
-                    </p:cTn>
-                  </p:par>
-                </p:childTnLst>
-              </p:cTn>
-              <p:prevCondLst>
-                <p:cond evt="onPrev" delay="0">
-                  <p:tgtEl>
-                    <p:sldTgt/>
-                  </p:tgtEl>
-                </p:cond>
-              </p:prevCondLst>
-              <p:nextCondLst>
-                <p:cond evt="onNext" delay="0">
-                  <p:tgtEl>
-                    <p:sldTgt/>
-                  </p:tgtEl>
-                </p:cond>
-              </p:nextCondLst>
-            </p:seq>
-          </p:childTnLst>
-        </p:cTn>
-      </p:par>
-    </p:tnLst>
-  </p:timing>
 </p:sld>
 </file>
 
@@ -33777,8 +33269,8 @@
           <a:chExt cx="0" cy="0"/>
         </a:xfrm>
       </p:grpSpPr>
-      <mc:AlternateContent xmlns:mc="http://schemas.openxmlformats.org/markup-compatibility/2006" xmlns:a14="http://schemas.microsoft.com/office/drawing/2010/main">
-        <mc:Choice Requires="a14">
+      <mc:AlternateContent xmlns:mc="http://schemas.openxmlformats.org/markup-compatibility/2006">
+        <mc:Choice xmlns:a14="http://schemas.microsoft.com/office/drawing/2010/main" Requires="a14">
           <p:sp>
             <p:nvSpPr>
               <p:cNvPr id="3" name="Content Placeholder 2">
@@ -33849,6 +33341,18 @@
                           </m:ctrlPr>
                         </m:dPr>
                         <m:e>
+                          <m:r>
+                            <a:rPr lang="en-US" b="0" i="1" smtClean="0">
+                              <a:latin typeface="Cambria Math" panose="02040503050406030204" pitchFamily="18" charset="0"/>
+                            </a:rPr>
+                            <m:t>𝑎</m:t>
+                          </m:r>
+                          <m:r>
+                            <a:rPr lang="en-US" b="0" i="1" smtClean="0">
+                              <a:latin typeface="Cambria Math" panose="02040503050406030204" pitchFamily="18" charset="0"/>
+                            </a:rPr>
+                            <m:t>,</m:t>
+                          </m:r>
                           <m:r>
                             <a:rPr lang="en-US" i="1">
                               <a:latin typeface="Cambria Math" panose="02040503050406030204" pitchFamily="18" charset="0"/>
@@ -33939,6 +33443,18 @@
                           </m:ctrlPr>
                         </m:dPr>
                         <m:e>
+                          <m:r>
+                            <a:rPr lang="en-US" b="0" i="1" smtClean="0">
+                              <a:latin typeface="Cambria Math" panose="02040503050406030204" pitchFamily="18" charset="0"/>
+                            </a:rPr>
+                            <m:t>𝑏</m:t>
+                          </m:r>
+                          <m:r>
+                            <a:rPr lang="en-US" b="0" i="1" smtClean="0">
+                              <a:latin typeface="Cambria Math" panose="02040503050406030204" pitchFamily="18" charset="0"/>
+                            </a:rPr>
+                            <m:t>,</m:t>
+                          </m:r>
                           <m:r>
                             <a:rPr lang="en-US" i="1">
                               <a:latin typeface="Cambria Math" panose="02040503050406030204" pitchFamily="18" charset="0"/>
@@ -34286,7 +33802,7 @@
             </p:txBody>
           </p:sp>
         </mc:Choice>
-        <mc:Fallback xmlns="">
+        <mc:Fallback>
           <p:sp>
             <p:nvSpPr>
               <p:cNvPr id="3" name="Content Placeholder 2">
@@ -34396,263 +33912,6 @@
   <p:clrMapOvr>
     <a:masterClrMapping/>
   </p:clrMapOvr>
-  <p:timing>
-    <p:tnLst>
-      <p:par>
-        <p:cTn id="1" dur="indefinite" restart="never" nodeType="tmRoot">
-          <p:childTnLst>
-            <p:seq concurrent="1" nextAc="seek">
-              <p:cTn id="2" dur="indefinite" nodeType="mainSeq">
-                <p:childTnLst>
-                  <p:par>
-                    <p:cTn id="3" fill="hold">
-                      <p:stCondLst>
-                        <p:cond delay="indefinite"/>
-                      </p:stCondLst>
-                      <p:childTnLst>
-                        <p:par>
-                          <p:cTn id="4" fill="hold">
-                            <p:stCondLst>
-                              <p:cond delay="0"/>
-                            </p:stCondLst>
-                            <p:childTnLst>
-                              <p:par>
-                                <p:cTn id="5" presetID="1" presetClass="entr" presetSubtype="0" fill="hold" nodeType="clickEffect">
-                                  <p:stCondLst>
-                                    <p:cond delay="0"/>
-                                  </p:stCondLst>
-                                  <p:childTnLst>
-                                    <p:set>
-                                      <p:cBhvr>
-                                        <p:cTn id="6" dur="1" fill="hold">
-                                          <p:stCondLst>
-                                            <p:cond delay="0"/>
-                                          </p:stCondLst>
-                                        </p:cTn>
-                                        <p:tgtEl>
-                                          <p:spTgt spid="3">
-                                            <p:txEl>
-                                              <p:pRg st="1" end="1"/>
-                                            </p:txEl>
-                                          </p:spTgt>
-                                        </p:tgtEl>
-                                        <p:attrNameLst>
-                                          <p:attrName>style.visibility</p:attrName>
-                                        </p:attrNameLst>
-                                      </p:cBhvr>
-                                      <p:to>
-                                        <p:strVal val="visible"/>
-                                      </p:to>
-                                    </p:set>
-                                  </p:childTnLst>
-                                </p:cTn>
-                              </p:par>
-                              <p:par>
-                                <p:cTn id="7" presetID="1" presetClass="entr" presetSubtype="0" fill="hold" nodeType="withEffect">
-                                  <p:stCondLst>
-                                    <p:cond delay="0"/>
-                                  </p:stCondLst>
-                                  <p:childTnLst>
-                                    <p:set>
-                                      <p:cBhvr>
-                                        <p:cTn id="8" dur="1" fill="hold">
-                                          <p:stCondLst>
-                                            <p:cond delay="0"/>
-                                          </p:stCondLst>
-                                        </p:cTn>
-                                        <p:tgtEl>
-                                          <p:spTgt spid="3">
-                                            <p:txEl>
-                                              <p:pRg st="2" end="2"/>
-                                            </p:txEl>
-                                          </p:spTgt>
-                                        </p:tgtEl>
-                                        <p:attrNameLst>
-                                          <p:attrName>style.visibility</p:attrName>
-                                        </p:attrNameLst>
-                                      </p:cBhvr>
-                                      <p:to>
-                                        <p:strVal val="visible"/>
-                                      </p:to>
-                                    </p:set>
-                                  </p:childTnLst>
-                                </p:cTn>
-                              </p:par>
-                            </p:childTnLst>
-                          </p:cTn>
-                        </p:par>
-                      </p:childTnLst>
-                    </p:cTn>
-                  </p:par>
-                  <p:par>
-                    <p:cTn id="9" fill="hold">
-                      <p:stCondLst>
-                        <p:cond delay="indefinite"/>
-                      </p:stCondLst>
-                      <p:childTnLst>
-                        <p:par>
-                          <p:cTn id="10" fill="hold">
-                            <p:stCondLst>
-                              <p:cond delay="0"/>
-                            </p:stCondLst>
-                            <p:childTnLst>
-                              <p:par>
-                                <p:cTn id="11" presetID="1" presetClass="entr" presetSubtype="0" fill="hold" nodeType="clickEffect">
-                                  <p:stCondLst>
-                                    <p:cond delay="0"/>
-                                  </p:stCondLst>
-                                  <p:childTnLst>
-                                    <p:set>
-                                      <p:cBhvr>
-                                        <p:cTn id="12" dur="1" fill="hold">
-                                          <p:stCondLst>
-                                            <p:cond delay="0"/>
-                                          </p:stCondLst>
-                                        </p:cTn>
-                                        <p:tgtEl>
-                                          <p:spTgt spid="3">
-                                            <p:txEl>
-                                              <p:pRg st="3" end="3"/>
-                                            </p:txEl>
-                                          </p:spTgt>
-                                        </p:tgtEl>
-                                        <p:attrNameLst>
-                                          <p:attrName>style.visibility</p:attrName>
-                                        </p:attrNameLst>
-                                      </p:cBhvr>
-                                      <p:to>
-                                        <p:strVal val="visible"/>
-                                      </p:to>
-                                    </p:set>
-                                  </p:childTnLst>
-                                </p:cTn>
-                              </p:par>
-                            </p:childTnLst>
-                          </p:cTn>
-                        </p:par>
-                      </p:childTnLst>
-                    </p:cTn>
-                  </p:par>
-                  <p:par>
-                    <p:cTn id="13" fill="hold">
-                      <p:stCondLst>
-                        <p:cond delay="indefinite"/>
-                      </p:stCondLst>
-                      <p:childTnLst>
-                        <p:par>
-                          <p:cTn id="14" fill="hold">
-                            <p:stCondLst>
-                              <p:cond delay="0"/>
-                            </p:stCondLst>
-                            <p:childTnLst>
-                              <p:par>
-                                <p:cTn id="15" presetID="1" presetClass="entr" presetSubtype="0" fill="hold" nodeType="clickEffect">
-                                  <p:stCondLst>
-                                    <p:cond delay="0"/>
-                                  </p:stCondLst>
-                                  <p:childTnLst>
-                                    <p:set>
-                                      <p:cBhvr>
-                                        <p:cTn id="16" dur="1" fill="hold">
-                                          <p:stCondLst>
-                                            <p:cond delay="0"/>
-                                          </p:stCondLst>
-                                        </p:cTn>
-                                        <p:tgtEl>
-                                          <p:spTgt spid="3">
-                                            <p:txEl>
-                                              <p:pRg st="4" end="4"/>
-                                            </p:txEl>
-                                          </p:spTgt>
-                                        </p:tgtEl>
-                                        <p:attrNameLst>
-                                          <p:attrName>style.visibility</p:attrName>
-                                        </p:attrNameLst>
-                                      </p:cBhvr>
-                                      <p:to>
-                                        <p:strVal val="visible"/>
-                                      </p:to>
-                                    </p:set>
-                                  </p:childTnLst>
-                                </p:cTn>
-                              </p:par>
-                            </p:childTnLst>
-                          </p:cTn>
-                        </p:par>
-                      </p:childTnLst>
-                    </p:cTn>
-                  </p:par>
-                  <p:par>
-                    <p:cTn id="17" fill="hold">
-                      <p:stCondLst>
-                        <p:cond delay="indefinite"/>
-                      </p:stCondLst>
-                      <p:childTnLst>
-                        <p:par>
-                          <p:cTn id="18" fill="hold">
-                            <p:stCondLst>
-                              <p:cond delay="0"/>
-                            </p:stCondLst>
-                            <p:childTnLst>
-                              <p:par>
-                                <p:cTn id="19" presetID="1" presetClass="entr" presetSubtype="0" fill="hold" nodeType="clickEffect">
-                                  <p:stCondLst>
-                                    <p:cond delay="0"/>
-                                  </p:stCondLst>
-                                  <p:childTnLst>
-                                    <p:set>
-                                      <p:cBhvr>
-                                        <p:cTn id="20" dur="1" fill="hold">
-                                          <p:stCondLst>
-                                            <p:cond delay="0"/>
-                                          </p:stCondLst>
-                                        </p:cTn>
-                                        <p:tgtEl>
-                                          <p:spTgt spid="3">
-                                            <p:txEl>
-                                              <p:pRg st="5" end="5"/>
-                                            </p:txEl>
-                                          </p:spTgt>
-                                        </p:tgtEl>
-                                        <p:attrNameLst>
-                                          <p:attrName>style.visibility</p:attrName>
-                                        </p:attrNameLst>
-                                      </p:cBhvr>
-                                      <p:to>
-                                        <p:strVal val="visible"/>
-                                      </p:to>
-                                    </p:set>
-                                  </p:childTnLst>
-                                </p:cTn>
-                              </p:par>
-                            </p:childTnLst>
-                          </p:cTn>
-                        </p:par>
-                      </p:childTnLst>
-                    </p:cTn>
-                  </p:par>
-                </p:childTnLst>
-              </p:cTn>
-              <p:prevCondLst>
-                <p:cond evt="onPrev" delay="0">
-                  <p:tgtEl>
-                    <p:sldTgt/>
-                  </p:tgtEl>
-                </p:cond>
-              </p:prevCondLst>
-              <p:nextCondLst>
-                <p:cond evt="onNext" delay="0">
-                  <p:tgtEl>
-                    <p:sldTgt/>
-                  </p:tgtEl>
-                </p:cond>
-              </p:nextCondLst>
-            </p:seq>
-          </p:childTnLst>
-        </p:cTn>
-      </p:par>
-    </p:tnLst>
-  </p:timing>
 </p:sld>
 </file>
 
@@ -41126,7 +40385,7 @@
             <a:pPr lvl="1"/>
             <a:r>
               <a:rPr lang="en-US" dirty="0"/>
-              <a:t>Sufficient depth – depth of data depth of analysis</a:t>
+              <a:t>Sufficient depth – depth of data, depth of analysis</a:t>
             </a:r>
           </a:p>
           <a:p>

</xml_diff>